<commit_message>
Minor tweaks after rehearsal
</commit_message>
<xml_diff>
--- a/POETS - CodeMash 2017.pptx
+++ b/POETS - CodeMash 2017.pptx
@@ -9701,8 +9701,64 @@
                 <a:ea typeface="+mn-ea"/>
                 <a:cs typeface="+mn-cs"/>
               </a:rPr>
-              <a:t>For example, let’s say you have an ecommerce site, and one of your business rules is that all orders of heavy equipment, from new customers, with a different bill-to and ship-to address, must go through a verification process to prevent fraud and expensive shipping mistakes. To write that test, you’ll have to create a customer with no previous orders, assign different bill-to and ship-to addresses, create an order containing a heavy equipment item, and attach the customer to the order.</a:t>
-            </a:r>
+              <a:t>For example, let’s say you have an ecommerce site, and one of your business rules is that all orders of heavy equipment, from new customers, with a different bill-to and ship-to address, must go through a verification process to prevent fraud and expensive shipping mistakes. To write that test, you’ll have to create a customer with no previous orders, assign different bill-to and ship-to addresses, create an order </a:t>
+            </a:r>
+            <a:r>
+              <a:rPr lang="en-US" sz="1200" kern="1200" dirty="0" smtClean="0">
+                <a:solidFill>
+                  <a:schemeClr val="tx1"/>
+                </a:solidFill>
+                <a:effectLst/>
+                <a:latin typeface="+mn-lt"/>
+                <a:ea typeface="+mn-ea"/>
+                <a:cs typeface="+mn-cs"/>
+              </a:rPr>
+              <a:t>containing a heavy equipment item, and attach the customer to the order.</a:t>
+            </a:r>
+          </a:p>
+          <a:p>
+            <a:endParaRPr lang="en-US" sz="1200" kern="1200" dirty="0" smtClean="0">
+              <a:solidFill>
+                <a:schemeClr val="tx1"/>
+              </a:solidFill>
+              <a:effectLst/>
+              <a:latin typeface="+mn-lt"/>
+              <a:ea typeface="+mn-ea"/>
+              <a:cs typeface="+mn-cs"/>
+            </a:endParaRPr>
+          </a:p>
+          <a:p>
+            <a:pPr marL="0" marR="0" lvl="0" indent="0" algn="l" defTabSz="914400" rtl="0" eaLnBrk="1" fontAlgn="auto" latinLnBrk="0" hangingPunct="1">
+              <a:lnSpc>
+                <a:spcPct val="100000"/>
+              </a:lnSpc>
+              <a:spcBef>
+                <a:spcPts val="0"/>
+              </a:spcBef>
+              <a:spcAft>
+                <a:spcPts val="0"/>
+              </a:spcAft>
+              <a:buClrTx/>
+              <a:buSzTx/>
+              <a:buFontTx/>
+              <a:buNone/>
+              <a:tabLst/>
+              <a:defRPr/>
+            </a:pPr>
+            <a:r>
+              <a:rPr lang="en-US" sz="1200" kern="1200" dirty="0" smtClean="0">
+                <a:solidFill>
+                  <a:schemeClr val="tx1"/>
+                </a:solidFill>
+                <a:effectLst/>
+                <a:latin typeface="+mn-lt"/>
+                <a:ea typeface="+mn-ea"/>
+                <a:cs typeface="+mn-cs"/>
+              </a:rPr>
+              <a:t>In these situations I use a pattern that we call a Scenario. This is essentially a façade that wraps the coordination of multiple Test Helpers towards a common goal and makes your setup code cleaner and more readable.</a:t>
+            </a:r>
+          </a:p>
+          <a:p>
             <a:endParaRPr lang="en-US" sz="1200" kern="1200" dirty="0">
               <a:solidFill>
                 <a:schemeClr val="tx1"/>
@@ -9805,7 +9861,7 @@
                 <a:ea typeface="+mn-ea"/>
                 <a:cs typeface="+mn-cs"/>
               </a:rPr>
-              <a:t>In these situations I use a pattern that we call a Scenario. This is essentially a façade that wraps the coordination of multiple Test Helpers towards a common goal and makes your setup code cleaner and more readable.</a:t>
+              <a:t>This is what it looks like.</a:t>
             </a:r>
           </a:p>
           <a:p>
@@ -9819,7 +9875,19 @@
                 <a:ea typeface="+mn-ea"/>
                 <a:cs typeface="+mn-cs"/>
               </a:rPr>
-              <a:t>You’ll notice that while a Test Helper is a static factory, a Scenario is something that you instantiate. You can still customize the result but you do it with constructor arguments and not method arguments.</a:t>
+              <a:t>You’ll </a:t>
+            </a:r>
+            <a:r>
+              <a:rPr lang="en-US" sz="1200" kern="1200" dirty="0" smtClean="0">
+                <a:solidFill>
+                  <a:schemeClr val="tx1"/>
+                </a:solidFill>
+                <a:effectLst/>
+                <a:latin typeface="+mn-lt"/>
+                <a:ea typeface="+mn-ea"/>
+                <a:cs typeface="+mn-cs"/>
+              </a:rPr>
+              <a:t>notice that while a Test Helper is a static factory, a Scenario is something that you instantiate. You can still customize the result but you do it with constructor arguments and not method arguments.</a:t>
             </a:r>
           </a:p>
           <a:p>

</xml_diff>

<commit_message>
Minor tweaks during rehearsal
</commit_message>
<xml_diff>
--- a/POETS - CodeMash 2017.pptx
+++ b/POETS - CodeMash 2017.pptx
@@ -298,7 +298,7 @@
           <a:p>
             <a:fld id="{C54A4886-B4AF-42F7-97BE-95CDF82A73E3}" type="datetimeFigureOut">
               <a:rPr lang="en-US" smtClean="0"/>
-              <a:t>11/30/2016</a:t>
+              <a:t>1/10/2017</a:t>
             </a:fld>
             <a:endParaRPr lang="en-US"/>
           </a:p>
@@ -3079,6 +3079,17 @@
             </a:r>
           </a:p>
           <a:p>
+            <a:endParaRPr lang="en-US" sz="1200" kern="1200" dirty="0" smtClean="0">
+              <a:solidFill>
+                <a:schemeClr val="tx1"/>
+              </a:solidFill>
+              <a:effectLst/>
+              <a:latin typeface="+mn-lt"/>
+              <a:ea typeface="+mn-ea"/>
+              <a:cs typeface="+mn-cs"/>
+            </a:endParaRPr>
+          </a:p>
+          <a:p>
             <a:r>
               <a:rPr lang="en-US" sz="1200" kern="1200" dirty="0" smtClean="0">
                 <a:solidFill>
@@ -3089,7 +3100,65 @@
                 <a:ea typeface="+mn-ea"/>
                 <a:cs typeface="+mn-cs"/>
               </a:rPr>
-              <a:t>If any of these things sound familiar, then you’ve got some work to do. To help you with that, I’ve identified 4 mistakes that you might be making that make your tests so ineffective.</a:t>
+              <a:t>If </a:t>
+            </a:r>
+            <a:r>
+              <a:rPr lang="en-US" sz="1200" kern="1200" dirty="0" smtClean="0">
+                <a:solidFill>
+                  <a:schemeClr val="tx1"/>
+                </a:solidFill>
+                <a:effectLst/>
+                <a:latin typeface="+mn-lt"/>
+                <a:ea typeface="+mn-ea"/>
+                <a:cs typeface="+mn-cs"/>
+              </a:rPr>
+              <a:t>any of these things sound familiar, then you’ve got some work to do. </a:t>
+            </a:r>
+            <a:endParaRPr lang="en-US" sz="1200" kern="1200" dirty="0" smtClean="0">
+              <a:solidFill>
+                <a:schemeClr val="tx1"/>
+              </a:solidFill>
+              <a:effectLst/>
+              <a:latin typeface="+mn-lt"/>
+              <a:ea typeface="+mn-ea"/>
+              <a:cs typeface="+mn-cs"/>
+            </a:endParaRPr>
+          </a:p>
+          <a:p>
+            <a:endParaRPr lang="en-US" sz="1200" kern="1200" dirty="0" smtClean="0">
+              <a:solidFill>
+                <a:schemeClr val="tx1"/>
+              </a:solidFill>
+              <a:effectLst/>
+              <a:latin typeface="+mn-lt"/>
+              <a:ea typeface="+mn-ea"/>
+              <a:cs typeface="+mn-cs"/>
+            </a:endParaRPr>
+          </a:p>
+          <a:p>
+            <a:r>
+              <a:rPr lang="en-US" sz="1200" kern="1200" dirty="0" smtClean="0">
+                <a:solidFill>
+                  <a:schemeClr val="tx1"/>
+                </a:solidFill>
+                <a:effectLst/>
+                <a:latin typeface="+mn-lt"/>
+                <a:ea typeface="+mn-ea"/>
+                <a:cs typeface="+mn-cs"/>
+              </a:rPr>
+              <a:t>To </a:t>
+            </a:r>
+            <a:r>
+              <a:rPr lang="en-US" sz="1200" kern="1200" dirty="0" smtClean="0">
+                <a:solidFill>
+                  <a:schemeClr val="tx1"/>
+                </a:solidFill>
+                <a:effectLst/>
+                <a:latin typeface="+mn-lt"/>
+                <a:ea typeface="+mn-ea"/>
+                <a:cs typeface="+mn-cs"/>
+              </a:rPr>
+              <a:t>help you with that, I’ve identified 4 mistakes that you might be making that make your tests so ineffective.</a:t>
             </a:r>
           </a:p>
           <a:p>
@@ -3187,7 +3256,31 @@
                 <a:ea typeface="+mn-ea"/>
                 <a:cs typeface="+mn-cs"/>
               </a:rPr>
-              <a:t>The second mistake people make when setting up tests is constructing all of your object dependencies by hand.</a:t>
+              <a:t>The </a:t>
+            </a:r>
+            <a:r>
+              <a:rPr lang="en-US" sz="1200" kern="1200" dirty="0" smtClean="0">
+                <a:solidFill>
+                  <a:schemeClr val="tx1"/>
+                </a:solidFill>
+                <a:effectLst/>
+                <a:latin typeface="+mn-lt"/>
+                <a:ea typeface="+mn-ea"/>
+                <a:cs typeface="+mn-cs"/>
+              </a:rPr>
+              <a:t>first mistake </a:t>
+            </a:r>
+            <a:r>
+              <a:rPr lang="en-US" sz="1200" kern="1200" dirty="0" smtClean="0">
+                <a:solidFill>
+                  <a:schemeClr val="tx1"/>
+                </a:solidFill>
+                <a:effectLst/>
+                <a:latin typeface="+mn-lt"/>
+                <a:ea typeface="+mn-ea"/>
+                <a:cs typeface="+mn-cs"/>
+              </a:rPr>
+              <a:t>people make when setting up tests is constructing all of your object dependencies by hand.</a:t>
             </a:r>
           </a:p>
           <a:p>
@@ -8253,6 +8346,143 @@
           <a:bodyPr/>
           <a:lstStyle/>
           <a:p>
+            <a:r>
+              <a:rPr lang="en-US" sz="1200" kern="1200" dirty="0" smtClean="0">
+                <a:solidFill>
+                  <a:schemeClr val="tx1"/>
+                </a:solidFill>
+                <a:effectLst/>
+                <a:latin typeface="+mn-lt"/>
+                <a:ea typeface="+mn-ea"/>
+                <a:cs typeface="+mn-cs"/>
+              </a:rPr>
+              <a:t>People often ask me why I write my own Test Helper classes instead of using a 3</a:t>
+            </a:r>
+            <a:r>
+              <a:rPr lang="en-US" sz="1200" kern="1200" baseline="30000" dirty="0" smtClean="0">
+                <a:solidFill>
+                  <a:schemeClr val="tx1"/>
+                </a:solidFill>
+                <a:effectLst/>
+                <a:latin typeface="+mn-lt"/>
+                <a:ea typeface="+mn-ea"/>
+                <a:cs typeface="+mn-cs"/>
+              </a:rPr>
+              <a:t>rd</a:t>
+            </a:r>
+            <a:r>
+              <a:rPr lang="en-US" sz="1200" kern="1200" dirty="0" smtClean="0">
+                <a:solidFill>
+                  <a:schemeClr val="tx1"/>
+                </a:solidFill>
+                <a:effectLst/>
+                <a:latin typeface="+mn-lt"/>
+                <a:ea typeface="+mn-ea"/>
+                <a:cs typeface="+mn-cs"/>
+              </a:rPr>
+              <a:t> party object construction library. </a:t>
+            </a:r>
+          </a:p>
+          <a:p>
+            <a:endParaRPr lang="en-US" sz="1200" kern="1200" dirty="0" smtClean="0">
+              <a:solidFill>
+                <a:schemeClr val="tx1"/>
+              </a:solidFill>
+              <a:effectLst/>
+              <a:latin typeface="+mn-lt"/>
+              <a:ea typeface="+mn-ea"/>
+              <a:cs typeface="+mn-cs"/>
+            </a:endParaRPr>
+          </a:p>
+          <a:p>
+            <a:r>
+              <a:rPr lang="en-US" sz="1200" kern="1200" dirty="0" smtClean="0">
+                <a:solidFill>
+                  <a:schemeClr val="tx1"/>
+                </a:solidFill>
+                <a:effectLst/>
+                <a:latin typeface="+mn-lt"/>
+                <a:ea typeface="+mn-ea"/>
+                <a:cs typeface="+mn-cs"/>
+              </a:rPr>
+              <a:t>In .NET there are libraries that take a generic type argument and automagically create an instance of that type, populating it with test data. This particular example is from a library called </a:t>
+            </a:r>
+            <a:r>
+              <a:rPr lang="en-US" sz="1200" kern="1200" dirty="0" err="1" smtClean="0">
+                <a:solidFill>
+                  <a:schemeClr val="tx1"/>
+                </a:solidFill>
+                <a:effectLst/>
+                <a:latin typeface="+mn-lt"/>
+                <a:ea typeface="+mn-ea"/>
+                <a:cs typeface="+mn-cs"/>
+              </a:rPr>
+              <a:t>AutoFixture</a:t>
+            </a:r>
+            <a:r>
+              <a:rPr lang="en-US" sz="1200" kern="1200" dirty="0" smtClean="0">
+                <a:solidFill>
+                  <a:schemeClr val="tx1"/>
+                </a:solidFill>
+                <a:effectLst/>
+                <a:latin typeface="+mn-lt"/>
+                <a:ea typeface="+mn-ea"/>
+                <a:cs typeface="+mn-cs"/>
+              </a:rPr>
+              <a:t>, and it looks super easy. Why not do this?</a:t>
+            </a:r>
+          </a:p>
+          <a:p>
+            <a:endParaRPr lang="en-US" sz="1200" kern="1200" dirty="0" smtClean="0">
+              <a:solidFill>
+                <a:schemeClr val="tx1"/>
+              </a:solidFill>
+              <a:effectLst/>
+              <a:latin typeface="+mn-lt"/>
+              <a:ea typeface="+mn-ea"/>
+              <a:cs typeface="+mn-cs"/>
+            </a:endParaRPr>
+          </a:p>
+          <a:p>
+            <a:r>
+              <a:rPr lang="en-US" sz="1200" kern="1200" dirty="0" smtClean="0">
+                <a:solidFill>
+                  <a:schemeClr val="tx1"/>
+                </a:solidFill>
+                <a:effectLst/>
+                <a:latin typeface="+mn-lt"/>
+                <a:ea typeface="+mn-ea"/>
+                <a:cs typeface="+mn-cs"/>
+              </a:rPr>
+              <a:t>The simple answer is that no library that you download can make better decisions about your test data than you can. Early on, when your objects are simple and you don’t have lots of special cases in your system then sure, this might work OK. But as things get complex, you’re going to want control over how your default values and properties get set up, and you don’t get that with a library.</a:t>
+            </a:r>
+          </a:p>
+          <a:p>
+            <a:endParaRPr lang="en-US" sz="1200" kern="1200" dirty="0" smtClean="0">
+              <a:solidFill>
+                <a:schemeClr val="tx1"/>
+              </a:solidFill>
+              <a:effectLst/>
+              <a:latin typeface="+mn-lt"/>
+              <a:ea typeface="+mn-ea"/>
+              <a:cs typeface="+mn-cs"/>
+            </a:endParaRPr>
+          </a:p>
+          <a:p>
+            <a:r>
+              <a:rPr lang="en-US" sz="1200" kern="1200" dirty="0" smtClean="0">
+                <a:solidFill>
+                  <a:schemeClr val="tx1"/>
+                </a:solidFill>
+                <a:effectLst/>
+                <a:latin typeface="+mn-lt"/>
+                <a:ea typeface="+mn-ea"/>
+                <a:cs typeface="+mn-cs"/>
+              </a:rPr>
+              <a:t>And in addition, these libraries tend to be noisier than custom code. </a:t>
+            </a:r>
+          </a:p>
+          <a:p>
             <a:endParaRPr lang="en-US" b="1" baseline="0" dirty="0" smtClean="0"/>
           </a:p>
         </p:txBody>
@@ -8337,6 +8567,69 @@
           <a:bodyPr/>
           <a:lstStyle/>
           <a:p>
+            <a:r>
+              <a:rPr lang="en-US" sz="1200" kern="1200" dirty="0" smtClean="0">
+                <a:solidFill>
+                  <a:schemeClr val="tx1"/>
+                </a:solidFill>
+                <a:effectLst/>
+                <a:latin typeface="+mn-lt"/>
+                <a:ea typeface="+mn-ea"/>
+                <a:cs typeface="+mn-cs"/>
+              </a:rPr>
+              <a:t>Here’s what </a:t>
+            </a:r>
+            <a:r>
+              <a:rPr lang="en-US" sz="1200" kern="1200" dirty="0" err="1" smtClean="0">
+                <a:solidFill>
+                  <a:schemeClr val="tx1"/>
+                </a:solidFill>
+                <a:effectLst/>
+                <a:latin typeface="+mn-lt"/>
+                <a:ea typeface="+mn-ea"/>
+                <a:cs typeface="+mn-cs"/>
+              </a:rPr>
+              <a:t>AutoFixture</a:t>
+            </a:r>
+            <a:r>
+              <a:rPr lang="en-US" sz="1200" kern="1200" dirty="0" smtClean="0">
+                <a:solidFill>
+                  <a:schemeClr val="tx1"/>
+                </a:solidFill>
+                <a:effectLst/>
+                <a:latin typeface="+mn-lt"/>
+                <a:ea typeface="+mn-ea"/>
+                <a:cs typeface="+mn-cs"/>
+              </a:rPr>
+              <a:t> looks like if you want to specify a value for a property. Sure is a lot simpler to read and write the Test Helper version.</a:t>
+            </a:r>
+          </a:p>
+          <a:p>
+            <a:endParaRPr lang="en-US" sz="1200" kern="1200" dirty="0" smtClean="0">
+              <a:solidFill>
+                <a:schemeClr val="tx1"/>
+              </a:solidFill>
+              <a:effectLst/>
+              <a:latin typeface="+mn-lt"/>
+              <a:ea typeface="+mn-ea"/>
+              <a:cs typeface="+mn-cs"/>
+            </a:endParaRPr>
+          </a:p>
+          <a:p>
+            <a:r>
+              <a:rPr lang="en-US" sz="1200" kern="1200" dirty="0" smtClean="0">
+                <a:solidFill>
+                  <a:schemeClr val="tx1"/>
+                </a:solidFill>
+                <a:effectLst/>
+                <a:latin typeface="+mn-lt"/>
+                <a:ea typeface="+mn-ea"/>
+                <a:cs typeface="+mn-cs"/>
+              </a:rPr>
+              <a:t>Basically, I look at it like this: when your app is small and simple, then the libraries might work. But if your app is small and simple, then introducing my Test Helper pattern is super easy too. And since Test Helper is designed to deal with complexity, you’ll start out with a solid foundation that will scale right along with your app code. And if your app is already really complex, then these libraries aren’t going to save you as much time as you might think.</a:t>
+            </a:r>
+          </a:p>
+          <a:p>
             <a:endParaRPr lang="en-US" b="1" baseline="0" dirty="0" smtClean="0"/>
           </a:p>
         </p:txBody>
@@ -10558,6 +10851,23 @@
           <a:bodyPr/>
           <a:lstStyle/>
           <a:p>
+            <a:pPr marL="0" marR="0" lvl="0" indent="0" algn="l" defTabSz="914400" rtl="0" eaLnBrk="1" fontAlgn="auto" latinLnBrk="0" hangingPunct="1">
+              <a:lnSpc>
+                <a:spcPct val="100000"/>
+              </a:lnSpc>
+              <a:spcBef>
+                <a:spcPts val="0"/>
+              </a:spcBef>
+              <a:spcAft>
+                <a:spcPts val="0"/>
+              </a:spcAft>
+              <a:buClrTx/>
+              <a:buSzTx/>
+              <a:buFontTx/>
+              <a:buNone/>
+              <a:tabLst/>
+              <a:defRPr/>
+            </a:pPr>
             <a:r>
               <a:rPr lang="en-US" sz="1200" kern="1200" dirty="0" smtClean="0">
                 <a:solidFill>
@@ -10568,8 +10878,19 @@
                 <a:ea typeface="+mn-ea"/>
                 <a:cs typeface="+mn-cs"/>
               </a:rPr>
-              <a:t>First, you have to deal with foreign keys. Your app may not care if you create a Line Item by itself, but you can’t save the Line Item to the database without an Order. And maybe you can’t create an Order without a customer. It’s the same issue we had with constructor dependencies, but in the database. </a:t>
-            </a:r>
+              <a:t>Unfortunately, it’s easier said than done.</a:t>
+            </a:r>
+          </a:p>
+          <a:p>
+            <a:endParaRPr lang="en-US" sz="1200" kern="1200" dirty="0" smtClean="0">
+              <a:solidFill>
+                <a:schemeClr val="tx1"/>
+              </a:solidFill>
+              <a:effectLst/>
+              <a:latin typeface="+mn-lt"/>
+              <a:ea typeface="+mn-ea"/>
+              <a:cs typeface="+mn-cs"/>
+            </a:endParaRPr>
           </a:p>
           <a:p>
             <a:r>
@@ -10582,7 +10903,56 @@
                 <a:ea typeface="+mn-ea"/>
                 <a:cs typeface="+mn-cs"/>
               </a:rPr>
-              <a:t>This means you have to new up the entire object graph and then save objects to the database in the correct sequence. </a:t>
+              <a:t>First</a:t>
+            </a:r>
+            <a:r>
+              <a:rPr lang="en-US" sz="1200" kern="1200" dirty="0" smtClean="0">
+                <a:solidFill>
+                  <a:schemeClr val="tx1"/>
+                </a:solidFill>
+                <a:effectLst/>
+                <a:latin typeface="+mn-lt"/>
+                <a:ea typeface="+mn-ea"/>
+                <a:cs typeface="+mn-cs"/>
+              </a:rPr>
+              <a:t>, you have to deal with foreign keys. Your app may not care if you create a Line Item by itself, but you can’t save the Line Item to the database without an Order. And maybe you can’t create an Order without a customer. It’s the same issue we had with constructor dependencies, but in the database. </a:t>
+            </a:r>
+          </a:p>
+          <a:p>
+            <a:endParaRPr lang="en-US" sz="1200" kern="1200" dirty="0" smtClean="0">
+              <a:solidFill>
+                <a:schemeClr val="tx1"/>
+              </a:solidFill>
+              <a:effectLst/>
+              <a:latin typeface="+mn-lt"/>
+              <a:ea typeface="+mn-ea"/>
+              <a:cs typeface="+mn-cs"/>
+            </a:endParaRPr>
+          </a:p>
+          <a:p>
+            <a:r>
+              <a:rPr lang="en-US" sz="1200" kern="1200" dirty="0" smtClean="0">
+                <a:solidFill>
+                  <a:schemeClr val="tx1"/>
+                </a:solidFill>
+                <a:effectLst/>
+                <a:latin typeface="+mn-lt"/>
+                <a:ea typeface="+mn-ea"/>
+                <a:cs typeface="+mn-cs"/>
+              </a:rPr>
+              <a:t>This </a:t>
+            </a:r>
+            <a:r>
+              <a:rPr lang="en-US" sz="1200" kern="1200" dirty="0" smtClean="0">
+                <a:solidFill>
+                  <a:schemeClr val="tx1"/>
+                </a:solidFill>
+                <a:effectLst/>
+                <a:latin typeface="+mn-lt"/>
+                <a:ea typeface="+mn-ea"/>
+                <a:cs typeface="+mn-cs"/>
+              </a:rPr>
+              <a:t>means you have to new up the entire object graph and then save objects to the database in the correct sequence. </a:t>
             </a:r>
           </a:p>
           <a:p>
@@ -11289,211 +11659,6 @@
               <a:t>And when they couldn’t avoid the tests, they ended up writing some pretty gnarly setup code. The best way to illustrate how bad it was is with a code sample. In one particular case I needed to make a minor adjustment to a feature. The feature itself was complex, but the new change was relatively simple and I didn’t think it would take much time. Before writing any new code, however, I wanted to learn more about how the feature currently worked and I wanted to write a failing test. So I opened up the file containing the tests and my heart sank when I saw this:  </a:t>
             </a:r>
           </a:p>
-          <a:p>
-            <a:r>
-              <a:rPr lang="en-US" sz="1200" b="1" kern="1200" dirty="0" smtClean="0">
-                <a:solidFill>
-                  <a:schemeClr val="tx1"/>
-                </a:solidFill>
-                <a:effectLst/>
-                <a:latin typeface="+mn-lt"/>
-                <a:ea typeface="+mn-ea"/>
-                <a:cs typeface="+mn-cs"/>
-              </a:rPr>
-              <a:t>(click – code sample)</a:t>
-            </a:r>
-            <a:endParaRPr lang="en-US" sz="1200" kern="1200" dirty="0" smtClean="0">
-              <a:solidFill>
-                <a:schemeClr val="tx1"/>
-              </a:solidFill>
-              <a:effectLst/>
-              <a:latin typeface="+mn-lt"/>
-              <a:ea typeface="+mn-ea"/>
-              <a:cs typeface="+mn-cs"/>
-            </a:endParaRPr>
-          </a:p>
-          <a:p>
-            <a:r>
-              <a:rPr lang="en-US" sz="1200" kern="1200" dirty="0" smtClean="0">
-                <a:solidFill>
-                  <a:schemeClr val="tx1"/>
-                </a:solidFill>
-                <a:effectLst/>
-                <a:latin typeface="+mn-lt"/>
-                <a:ea typeface="+mn-ea"/>
-                <a:cs typeface="+mn-cs"/>
-              </a:rPr>
-              <a:t>and this…. </a:t>
-            </a:r>
-          </a:p>
-          <a:p>
-            <a:r>
-              <a:rPr lang="en-US" sz="1200" kern="1200" dirty="0" smtClean="0">
-                <a:solidFill>
-                  <a:schemeClr val="tx1"/>
-                </a:solidFill>
-                <a:effectLst/>
-                <a:latin typeface="+mn-lt"/>
-                <a:ea typeface="+mn-ea"/>
-                <a:cs typeface="+mn-cs"/>
-              </a:rPr>
-              <a:t>(click)</a:t>
-            </a:r>
-          </a:p>
-          <a:p>
-            <a:r>
-              <a:rPr lang="en-US" sz="1200" kern="1200" dirty="0" smtClean="0">
-                <a:solidFill>
-                  <a:schemeClr val="tx1"/>
-                </a:solidFill>
-                <a:effectLst/>
-                <a:latin typeface="+mn-lt"/>
-                <a:ea typeface="+mn-ea"/>
-                <a:cs typeface="+mn-cs"/>
-              </a:rPr>
-              <a:t>And this.</a:t>
-            </a:r>
-          </a:p>
-          <a:p>
-            <a:r>
-              <a:rPr lang="en-US" sz="1200" kern="1200" dirty="0" smtClean="0">
-                <a:solidFill>
-                  <a:schemeClr val="tx1"/>
-                </a:solidFill>
-                <a:effectLst/>
-                <a:latin typeface="+mn-lt"/>
-                <a:ea typeface="+mn-ea"/>
-                <a:cs typeface="+mn-cs"/>
-              </a:rPr>
-              <a:t>That’s </a:t>
-            </a:r>
-          </a:p>
-          <a:p>
-            <a:r>
-              <a:rPr lang="en-US" sz="1200" kern="1200" dirty="0" smtClean="0">
-                <a:solidFill>
-                  <a:schemeClr val="tx1"/>
-                </a:solidFill>
-                <a:effectLst/>
-                <a:latin typeface="+mn-lt"/>
-                <a:ea typeface="+mn-ea"/>
-                <a:cs typeface="+mn-cs"/>
-              </a:rPr>
-              <a:t>(click) 29 string, integer and Boolean values being initialized, </a:t>
-            </a:r>
-          </a:p>
-          <a:p>
-            <a:r>
-              <a:rPr lang="en-US" sz="1200" kern="1200" dirty="0" smtClean="0">
-                <a:solidFill>
-                  <a:schemeClr val="tx1"/>
-                </a:solidFill>
-                <a:effectLst/>
-                <a:latin typeface="+mn-lt"/>
-                <a:ea typeface="+mn-ea"/>
-                <a:cs typeface="+mn-cs"/>
-              </a:rPr>
-              <a:t>(click) 7 different objects being created and </a:t>
-            </a:r>
-          </a:p>
-          <a:p>
-            <a:r>
-              <a:rPr lang="en-US" sz="1200" kern="1200" dirty="0" smtClean="0">
-                <a:solidFill>
-                  <a:schemeClr val="tx1"/>
-                </a:solidFill>
-                <a:effectLst/>
-                <a:latin typeface="+mn-lt"/>
-                <a:ea typeface="+mn-ea"/>
-                <a:cs typeface="+mn-cs"/>
-              </a:rPr>
-              <a:t>(click) 75 lines of code to understand. </a:t>
-            </a:r>
-          </a:p>
-          <a:p>
-            <a:r>
-              <a:rPr lang="en-US" sz="1200" kern="1200" dirty="0" smtClean="0">
-                <a:solidFill>
-                  <a:schemeClr val="tx1"/>
-                </a:solidFill>
-                <a:effectLst/>
-                <a:latin typeface="+mn-lt"/>
-                <a:ea typeface="+mn-ea"/>
-                <a:cs typeface="+mn-cs"/>
-              </a:rPr>
-              <a:t>(click) CRAP! And even worse, this is just the SHARED setup code for the test suite! Each individual test in the suite had more code like this, and each test depended on different portions of this mess.</a:t>
-            </a:r>
-          </a:p>
-          <a:p>
-            <a:r>
-              <a:rPr lang="en-US" sz="1200" kern="1200" dirty="0" smtClean="0">
-                <a:solidFill>
-                  <a:schemeClr val="tx1"/>
-                </a:solidFill>
-                <a:effectLst/>
-                <a:latin typeface="+mn-lt"/>
-                <a:ea typeface="+mn-ea"/>
-                <a:cs typeface="+mn-cs"/>
-              </a:rPr>
-              <a:t>It was clear that even though my change was simple, just modifying the existing tests would be difficult, let alone adding new ones. I went back to the team, increased my estimate, and spent way more time than should have been necessary implementing that change.</a:t>
-            </a:r>
-          </a:p>
-          <a:p>
-            <a:r>
-              <a:rPr lang="en-US" sz="1200" kern="1200" dirty="0" smtClean="0">
-                <a:solidFill>
-                  <a:schemeClr val="tx1"/>
-                </a:solidFill>
-                <a:effectLst/>
-                <a:latin typeface="+mn-lt"/>
-                <a:ea typeface="+mn-ea"/>
-                <a:cs typeface="+mn-cs"/>
-              </a:rPr>
-              <a:t>And this is not an isolated case! We have thousands of tests in our projects and we spend countless hours reading those tests and trying to make sense of stuff like this.</a:t>
-            </a:r>
-          </a:p>
-          <a:p>
-            <a:r>
-              <a:rPr lang="en-US" sz="1200" kern="1200" dirty="0" smtClean="0">
-                <a:solidFill>
-                  <a:schemeClr val="tx1"/>
-                </a:solidFill>
-                <a:effectLst/>
-                <a:latin typeface="+mn-lt"/>
-                <a:ea typeface="+mn-ea"/>
-                <a:cs typeface="+mn-cs"/>
-              </a:rPr>
-              <a:t>This sucks! But there is a better way.</a:t>
-            </a:r>
-          </a:p>
-          <a:p>
-            <a:pPr marL="0" marR="0" indent="0" algn="l" defTabSz="914400" rtl="0" eaLnBrk="1" fontAlgn="auto" latinLnBrk="0" hangingPunct="1">
-              <a:lnSpc>
-                <a:spcPct val="100000"/>
-              </a:lnSpc>
-              <a:spcBef>
-                <a:spcPts val="0"/>
-              </a:spcBef>
-              <a:spcAft>
-                <a:spcPts val="0"/>
-              </a:spcAft>
-              <a:buClrTx/>
-              <a:buSzTx/>
-              <a:buFontTx/>
-              <a:buNone/>
-              <a:tabLst/>
-              <a:defRPr/>
-            </a:pPr>
-            <a:endParaRPr lang="en-US" sz="1200" kern="1200" dirty="0" smtClean="0">
-              <a:solidFill>
-                <a:schemeClr val="tx1"/>
-              </a:solidFill>
-              <a:effectLst/>
-              <a:latin typeface="+mn-lt"/>
-              <a:ea typeface="+mn-ea"/>
-              <a:cs typeface="+mn-cs"/>
-            </a:endParaRPr>
-          </a:p>
         </p:txBody>
       </p:sp>
       <p:sp>
@@ -12960,96 +13125,6 @@
         <p:txBody>
           <a:bodyPr/>
           <a:lstStyle/>
-          <a:p>
-            <a:pPr marL="171450" indent="-171450">
-              <a:buFont typeface="Arial" panose="020B0604020202020204" pitchFamily="34" charset="0"/>
-              <a:buChar char="•"/>
-            </a:pPr>
-            <a:r>
-              <a:rPr lang="en-US" b="0" dirty="0" smtClean="0"/>
-              <a:t>Minute ago said I hated seeing people</a:t>
-            </a:r>
-            <a:r>
-              <a:rPr lang="en-US" b="0" baseline="0" dirty="0" smtClean="0"/>
-              <a:t> SKIP tests because they would be hard to write</a:t>
-            </a:r>
-            <a:br>
-              <a:rPr lang="en-US" b="0" baseline="0" dirty="0" smtClean="0"/>
-            </a:br>
-            <a:endParaRPr lang="en-US" b="0" baseline="0" dirty="0" smtClean="0"/>
-          </a:p>
-          <a:p>
-            <a:pPr marL="171450" indent="-171450">
-              <a:buFont typeface="Arial" panose="020B0604020202020204" pitchFamily="34" charset="0"/>
-              <a:buChar char="•"/>
-            </a:pPr>
-            <a:r>
-              <a:rPr lang="en-US" b="0" baseline="0" dirty="0" smtClean="0"/>
-              <a:t>That’s only half the reason I wrote this talk – other half is seeing really convoluted setup code in the tests that DO get written</a:t>
-            </a:r>
-            <a:br>
-              <a:rPr lang="en-US" b="0" baseline="0" dirty="0" smtClean="0"/>
-            </a:br>
-            <a:endParaRPr lang="en-US" b="0" baseline="0" dirty="0" smtClean="0"/>
-          </a:p>
-          <a:p>
-            <a:pPr marL="171450" indent="-171450">
-              <a:buFont typeface="Arial" panose="020B0604020202020204" pitchFamily="34" charset="0"/>
-              <a:buChar char="•"/>
-            </a:pPr>
-            <a:r>
-              <a:rPr lang="en-US" b="0" baseline="0" dirty="0" smtClean="0"/>
-              <a:t>Here’s an example – needed to make minor adjustment to a feature</a:t>
-            </a:r>
-            <a:br>
-              <a:rPr lang="en-US" b="0" baseline="0" dirty="0" smtClean="0"/>
-            </a:br>
-            <a:endParaRPr lang="en-US" b="0" baseline="0" dirty="0" smtClean="0"/>
-          </a:p>
-          <a:p>
-            <a:pPr marL="171450" indent="-171450">
-              <a:buFont typeface="Arial" panose="020B0604020202020204" pitchFamily="34" charset="0"/>
-              <a:buChar char="•"/>
-            </a:pPr>
-            <a:r>
-              <a:rPr lang="en-US" b="0" baseline="0" dirty="0" smtClean="0"/>
-              <a:t>Feature itself was complex, but the new change was simple – should not take a lot of time</a:t>
-            </a:r>
-            <a:br>
-              <a:rPr lang="en-US" b="0" baseline="0" dirty="0" smtClean="0"/>
-            </a:br>
-            <a:endParaRPr lang="en-US" b="0" baseline="0" dirty="0" smtClean="0"/>
-          </a:p>
-          <a:p>
-            <a:pPr marL="171450" indent="-171450">
-              <a:buFont typeface="Arial" panose="020B0604020202020204" pitchFamily="34" charset="0"/>
-              <a:buChar char="•"/>
-            </a:pPr>
-            <a:r>
-              <a:rPr lang="en-US" b="0" baseline="0" dirty="0" smtClean="0"/>
-              <a:t>Before writing any new code, wanted to learn more about how the feature currently worked and wanted to write a failing test</a:t>
-            </a:r>
-          </a:p>
-          <a:p>
-            <a:pPr marL="171450" indent="-171450">
-              <a:buFont typeface="Arial" panose="020B0604020202020204" pitchFamily="34" charset="0"/>
-              <a:buChar char="•"/>
-            </a:pPr>
-            <a:endParaRPr lang="en-US" b="0" baseline="0" dirty="0" smtClean="0"/>
-          </a:p>
-          <a:p>
-            <a:pPr marL="0" indent="0">
-              <a:buFont typeface="Arial" panose="020B0604020202020204" pitchFamily="34" charset="0"/>
-              <a:buNone/>
-            </a:pPr>
-            <a:r>
-              <a:rPr lang="en-US" b="0" baseline="0" dirty="0" smtClean="0"/>
-              <a:t>CLICK: So I opened up the file containing the existing tests, and my heart sank when I saw this: &lt;PAUSE&gt;</a:t>
-            </a:r>
-          </a:p>
-          <a:p>
-            <a:endParaRPr lang="en-US" b="1" dirty="0" smtClean="0"/>
-          </a:p>
           <a:p>
             <a:endParaRPr lang="en-US" dirty="0"/>
           </a:p>
@@ -13586,7 +13661,7 @@
           <a:p>
             <a:fld id="{75AA6396-395E-4ADA-8EE5-F328BC863A04}" type="datetimeFigureOut">
               <a:rPr lang="en-US" smtClean="0"/>
-              <a:t>11/30/2016</a:t>
+              <a:t>1/10/2017</a:t>
             </a:fld>
             <a:endParaRPr lang="en-US"/>
           </a:p>
@@ -13763,7 +13838,7 @@
           <a:p>
             <a:fld id="{75AA6396-395E-4ADA-8EE5-F328BC863A04}" type="datetimeFigureOut">
               <a:rPr lang="en-US" smtClean="0"/>
-              <a:t>11/30/2016</a:t>
+              <a:t>1/10/2017</a:t>
             </a:fld>
             <a:endParaRPr lang="en-US"/>
           </a:p>
@@ -13943,7 +14018,7 @@
           <a:p>
             <a:fld id="{75AA6396-395E-4ADA-8EE5-F328BC863A04}" type="datetimeFigureOut">
               <a:rPr lang="en-US" smtClean="0"/>
-              <a:t>11/30/2016</a:t>
+              <a:t>1/10/2017</a:t>
             </a:fld>
             <a:endParaRPr lang="en-US"/>
           </a:p>
@@ -14163,7 +14238,7 @@
           <a:p>
             <a:fld id="{75AA6396-395E-4ADA-8EE5-F328BC863A04}" type="datetimeFigureOut">
               <a:rPr lang="en-US" smtClean="0"/>
-              <a:t>11/30/2016</a:t>
+              <a:t>1/10/2017</a:t>
             </a:fld>
             <a:endParaRPr lang="en-US"/>
           </a:p>
@@ -14416,7 +14491,7 @@
           <a:p>
             <a:fld id="{75AA6396-395E-4ADA-8EE5-F328BC863A04}" type="datetimeFigureOut">
               <a:rPr lang="en-US" smtClean="0"/>
-              <a:t>11/30/2016</a:t>
+              <a:t>1/10/2017</a:t>
             </a:fld>
             <a:endParaRPr lang="en-US"/>
           </a:p>
@@ -14655,7 +14730,7 @@
           <a:p>
             <a:fld id="{75AA6396-395E-4ADA-8EE5-F328BC863A04}" type="datetimeFigureOut">
               <a:rPr lang="en-US" smtClean="0"/>
-              <a:t>11/30/2016</a:t>
+              <a:t>1/10/2017</a:t>
             </a:fld>
             <a:endParaRPr lang="en-US"/>
           </a:p>
@@ -15029,7 +15104,7 @@
           <a:p>
             <a:fld id="{75AA6396-395E-4ADA-8EE5-F328BC863A04}" type="datetimeFigureOut">
               <a:rPr lang="en-US" smtClean="0"/>
-              <a:t>11/30/2016</a:t>
+              <a:t>1/10/2017</a:t>
             </a:fld>
             <a:endParaRPr lang="en-US"/>
           </a:p>
@@ -15147,7 +15222,7 @@
           <a:p>
             <a:fld id="{75AA6396-395E-4ADA-8EE5-F328BC863A04}" type="datetimeFigureOut">
               <a:rPr lang="en-US" smtClean="0"/>
-              <a:t>11/30/2016</a:t>
+              <a:t>1/10/2017</a:t>
             </a:fld>
             <a:endParaRPr lang="en-US"/>
           </a:p>
@@ -15242,7 +15317,7 @@
           <a:p>
             <a:fld id="{75AA6396-395E-4ADA-8EE5-F328BC863A04}" type="datetimeFigureOut">
               <a:rPr lang="en-US" smtClean="0"/>
-              <a:t>11/30/2016</a:t>
+              <a:t>1/10/2017</a:t>
             </a:fld>
             <a:endParaRPr lang="en-US"/>
           </a:p>
@@ -15519,7 +15594,7 @@
           <a:p>
             <a:fld id="{75AA6396-395E-4ADA-8EE5-F328BC863A04}" type="datetimeFigureOut">
               <a:rPr lang="en-US" smtClean="0"/>
-              <a:t>11/30/2016</a:t>
+              <a:t>1/10/2017</a:t>
             </a:fld>
             <a:endParaRPr lang="en-US"/>
           </a:p>
@@ -15772,7 +15847,7 @@
           <a:p>
             <a:fld id="{75AA6396-395E-4ADA-8EE5-F328BC863A04}" type="datetimeFigureOut">
               <a:rPr lang="en-US" smtClean="0"/>
-              <a:t>11/30/2016</a:t>
+              <a:t>1/10/2017</a:t>
             </a:fld>
             <a:endParaRPr lang="en-US"/>
           </a:p>
@@ -15985,7 +16060,7 @@
           <a:p>
             <a:fld id="{75AA6396-395E-4ADA-8EE5-F328BC863A04}" type="datetimeFigureOut">
               <a:rPr lang="en-US" smtClean="0"/>
-              <a:t>11/30/2016</a:t>
+              <a:t>1/10/2017</a:t>
             </a:fld>
             <a:endParaRPr lang="en-US"/>
           </a:p>
@@ -16402,7 +16477,7 @@
         </p:nvSpPr>
         <p:spPr>
           <a:xfrm>
-            <a:off x="838196" y="1456506"/>
+            <a:off x="838196" y="223607"/>
             <a:ext cx="10515600" cy="2069850"/>
           </a:xfrm>
         </p:spPr>
@@ -16442,8 +16517,8 @@
         </p:nvSpPr>
         <p:spPr>
           <a:xfrm>
-            <a:off x="4000134" y="4042549"/>
-            <a:ext cx="4191725" cy="1938992"/>
+            <a:off x="4329454" y="4710369"/>
+            <a:ext cx="3533083" cy="1938992"/>
           </a:xfrm>
           <a:prstGeom prst="rect">
             <a:avLst/>
@@ -16451,7 +16526,7 @@
           <a:noFill/>
         </p:spPr>
         <p:txBody>
-          <a:bodyPr wrap="none" rtlCol="0">
+          <a:bodyPr wrap="none" rtlCol="0" anchor="b">
             <a:spAutoFit/>
           </a:bodyPr>
           <a:lstStyle/>
@@ -16463,7 +16538,7 @@
                   <a:srgbClr val="013947"/>
                 </a:solidFill>
               </a:rPr>
-              <a:t>Seth Petry-Johnson</a:t>
+              <a:t/>
             </a:r>
             <a:br>
               <a:rPr lang="en-US" sz="4000" dirty="0" smtClean="0">
@@ -16504,6 +16579,30 @@
           </a:p>
         </p:txBody>
       </p:sp>
+      <p:pic>
+        <p:nvPicPr>
+          <p:cNvPr id="3" name="Picture 2"/>
+          <p:cNvPicPr>
+            <a:picLocks noChangeAspect="1"/>
+          </p:cNvPicPr>
+          <p:nvPr/>
+        </p:nvPicPr>
+        <p:blipFill>
+          <a:blip r:embed="rId3"/>
+          <a:stretch>
+            <a:fillRect/>
+          </a:stretch>
+        </p:blipFill>
+        <p:spPr>
+          <a:xfrm>
+            <a:off x="4527914" y="1965960"/>
+            <a:ext cx="3136162" cy="3633456"/>
+          </a:xfrm>
+          <a:prstGeom prst="rect">
+            <a:avLst/>
+          </a:prstGeom>
+        </p:spPr>
+      </p:pic>
     </p:spTree>
     <p:extLst>
       <p:ext uri="{BB962C8B-B14F-4D97-AF65-F5344CB8AC3E}">
@@ -21058,11 +21157,7 @@
           <a:p>
             <a:r>
               <a:rPr lang="en-US" sz="4800" dirty="0" smtClean="0"/>
-              <a:t>Mistake #2: </a:t>
-            </a:r>
-            <a:r>
-              <a:rPr lang="en-US" sz="4800" dirty="0" smtClean="0"/>
-              <a:t>Setup is hard to understand</a:t>
+              <a:t>Mistake #2: Setup is hard to understand</a:t>
             </a:r>
             <a:endParaRPr lang="en-US" sz="4800" dirty="0"/>
           </a:p>
@@ -21416,7 +21511,6 @@
               <a:rPr lang="en-US" sz="4800" dirty="0"/>
               <a:t>Setup is hard to understand</a:t>
             </a:r>
-            <a:endParaRPr lang="en-US" sz="4800" dirty="0"/>
           </a:p>
         </p:txBody>
       </p:sp>
@@ -26271,11 +26365,11 @@
   <p:clrMapOvr>
     <a:masterClrMapping/>
   </p:clrMapOvr>
-  <mc:AlternateContent xmlns:mc="http://schemas.openxmlformats.org/markup-compatibility/2006">
-    <mc:Choice xmlns:p14="http://schemas.microsoft.com/office/powerpoint/2010/main" Requires="p14">
+  <mc:AlternateContent xmlns:mc="http://schemas.openxmlformats.org/markup-compatibility/2006" xmlns:p14="http://schemas.microsoft.com/office/powerpoint/2010/main">
+    <mc:Choice Requires="p14">
       <p:transition spd="slow" p14:dur="2000"/>
     </mc:Choice>
-    <mc:Fallback>
+    <mc:Fallback xmlns="">
       <p:transition spd="slow"/>
     </mc:Fallback>
   </mc:AlternateContent>

</xml_diff>

<commit_message>
Will the edits never end?
</commit_message>
<xml_diff>
--- a/POETS - CodeMash 2017.pptx
+++ b/POETS - CodeMash 2017.pptx
@@ -5,7 +5,7 @@
     <p:sldMasterId id="2147483749" r:id="rId1"/>
   </p:sldMasterIdLst>
   <p:notesMasterIdLst>
-    <p:notesMasterId r:id="rId95"/>
+    <p:notesMasterId r:id="rId96"/>
   </p:notesMasterIdLst>
   <p:sldIdLst>
     <p:sldId id="395" r:id="rId2"/>
@@ -94,13 +94,14 @@
     <p:sldId id="384" r:id="rId85"/>
     <p:sldId id="385" r:id="rId86"/>
     <p:sldId id="386" r:id="rId87"/>
-    <p:sldId id="343" r:id="rId88"/>
-    <p:sldId id="389" r:id="rId89"/>
-    <p:sldId id="390" r:id="rId90"/>
-    <p:sldId id="391" r:id="rId91"/>
-    <p:sldId id="273" r:id="rId92"/>
-    <p:sldId id="441" r:id="rId93"/>
-    <p:sldId id="443" r:id="rId94"/>
+    <p:sldId id="486" r:id="rId88"/>
+    <p:sldId id="343" r:id="rId89"/>
+    <p:sldId id="389" r:id="rId90"/>
+    <p:sldId id="390" r:id="rId91"/>
+    <p:sldId id="391" r:id="rId92"/>
+    <p:sldId id="273" r:id="rId93"/>
+    <p:sldId id="441" r:id="rId94"/>
+    <p:sldId id="443" r:id="rId95"/>
   </p:sldIdLst>
   <p:sldSz cx="12192000" cy="6858000"/>
   <p:notesSz cx="6858000" cy="9144000"/>
@@ -12369,16 +12370,16 @@
           <a:lstStyle/>
           <a:p>
             <a:r>
-              <a:rPr lang="en-US" sz="1200" kern="1200" smtClean="0">
-                <a:solidFill>
-                  <a:schemeClr val="tx1"/>
-                </a:solidFill>
-                <a:effectLst/>
-                <a:latin typeface="+mn-lt"/>
-                <a:ea typeface="+mn-ea"/>
-                <a:cs typeface="+mn-cs"/>
-              </a:rPr>
-              <a:t>Also, remember that Scenarios are helpful because they simplify the coordination of multiple related objects into a single abstraction. If you need a lot of Scenarios, that might be a code smell indicating that you should simplify your main application code instead. </a:t>
+              <a:rPr lang="en-US" sz="1200" kern="1200" dirty="0" smtClean="0">
+                <a:solidFill>
+                  <a:schemeClr val="tx1"/>
+                </a:solidFill>
+                <a:effectLst/>
+                <a:latin typeface="+mn-lt"/>
+                <a:ea typeface="+mn-ea"/>
+                <a:cs typeface="+mn-cs"/>
+              </a:rPr>
+              <a:t>Put another way, complex code begets complex setup. </a:t>
             </a:r>
           </a:p>
           <a:p>
@@ -12403,56 +12404,19 @@
                 <a:ea typeface="+mn-ea"/>
                 <a:cs typeface="+mn-cs"/>
               </a:rPr>
-              <a:t>For instance, in that e-commerce example I just showed you, I had to set up an Order, and Customer, and some Line Items, and I had to wire all that stuff together so that I could test code that deals with all of those objects. If I find myself doing that a lot, then maybe there’s the need for some kind of flattened, simplified “Order Summary” object in the main app. </a:t>
-            </a:r>
-          </a:p>
-          <a:p>
-            <a:endParaRPr lang="en-US" sz="1200" kern="1200" smtClean="0">
-              <a:solidFill>
-                <a:schemeClr val="tx1"/>
-              </a:solidFill>
-              <a:effectLst/>
-              <a:latin typeface="+mn-lt"/>
-              <a:ea typeface="+mn-ea"/>
-              <a:cs typeface="+mn-cs"/>
-            </a:endParaRPr>
-          </a:p>
-          <a:p>
-            <a:r>
-              <a:rPr lang="en-US" sz="1200" kern="1200" smtClean="0">
-                <a:solidFill>
-                  <a:schemeClr val="tx1"/>
-                </a:solidFill>
-                <a:effectLst/>
-                <a:latin typeface="+mn-lt"/>
-                <a:ea typeface="+mn-ea"/>
-                <a:cs typeface="+mn-cs"/>
-              </a:rPr>
-              <a:t>And generally speaking, anything that you do to SIMPLIFY YOUR MAIN AP</a:t>
-            </a:r>
-            <a:r>
-              <a:rPr lang="en-US" sz="1200" kern="1200" baseline="0" smtClean="0">
-                <a:solidFill>
-                  <a:schemeClr val="tx1"/>
-                </a:solidFill>
-                <a:effectLst/>
-                <a:latin typeface="+mn-lt"/>
-                <a:ea typeface="+mn-ea"/>
-                <a:cs typeface="+mn-cs"/>
-              </a:rPr>
-              <a:t>P </a:t>
-            </a:r>
-            <a:r>
-              <a:rPr lang="en-US" sz="1200" kern="1200" smtClean="0">
-                <a:solidFill>
-                  <a:schemeClr val="tx1"/>
-                </a:solidFill>
-                <a:effectLst/>
-                <a:latin typeface="+mn-lt"/>
-                <a:ea typeface="+mn-ea"/>
-                <a:cs typeface="+mn-cs"/>
-              </a:rPr>
-              <a:t>will also simplify your tests.</a:t>
+              <a:t>If </a:t>
+            </a:r>
+            <a:r>
+              <a:rPr lang="en-US" sz="1200" kern="1200" dirty="0" smtClean="0">
+                <a:solidFill>
+                  <a:schemeClr val="tx1"/>
+                </a:solidFill>
+                <a:effectLst/>
+                <a:latin typeface="+mn-lt"/>
+                <a:ea typeface="+mn-ea"/>
+                <a:cs typeface="+mn-cs"/>
+              </a:rPr>
+              <a:t>you find yourself doing a lot of stuff in your test projects to compensate for complexity in your application code, try to simplify the app first. Scenario objects are great tools, but it’s even better to not need them.</a:t>
             </a:r>
             <a:endParaRPr lang="en-US" sz="1200" kern="1200" dirty="0">
               <a:solidFill>
@@ -14291,6 +14255,23 @@
             </a:r>
           </a:p>
           <a:p>
+            <a:pPr marL="0" marR="0" lvl="0" indent="0" algn="l" defTabSz="914400" rtl="0" eaLnBrk="1" fontAlgn="auto" latinLnBrk="0" hangingPunct="1">
+              <a:lnSpc>
+                <a:spcPct val="100000"/>
+              </a:lnSpc>
+              <a:spcBef>
+                <a:spcPts val="0"/>
+              </a:spcBef>
+              <a:spcAft>
+                <a:spcPts val="0"/>
+              </a:spcAft>
+              <a:buClrTx/>
+              <a:buSzTx/>
+              <a:buFontTx/>
+              <a:buNone/>
+              <a:tabLst/>
+              <a:defRPr/>
+            </a:pPr>
             <a:endParaRPr lang="en-US" sz="1200" kern="1200" dirty="0" smtClean="0">
               <a:solidFill>
                 <a:schemeClr val="tx1"/>
@@ -14302,6 +14283,23 @@
             </a:endParaRPr>
           </a:p>
           <a:p>
+            <a:pPr marL="0" marR="0" lvl="0" indent="0" algn="l" defTabSz="914400" rtl="0" eaLnBrk="1" fontAlgn="auto" latinLnBrk="0" hangingPunct="1">
+              <a:lnSpc>
+                <a:spcPct val="100000"/>
+              </a:lnSpc>
+              <a:spcBef>
+                <a:spcPts val="0"/>
+              </a:spcBef>
+              <a:spcAft>
+                <a:spcPts val="0"/>
+              </a:spcAft>
+              <a:buClrTx/>
+              <a:buSzTx/>
+              <a:buFontTx/>
+              <a:buNone/>
+              <a:tabLst/>
+              <a:defRPr/>
+            </a:pPr>
             <a:r>
               <a:rPr lang="en-US" sz="1200" kern="1200" dirty="0" smtClean="0">
                 <a:solidFill>
@@ -14312,22 +14310,44 @@
                 <a:ea typeface="+mn-ea"/>
                 <a:cs typeface="+mn-cs"/>
               </a:rPr>
-              <a:t>If you follow this pattern then you can basically write a bunch of unit tests with in-memory data, copy and paste the setup code from one of them into an integration test, add a few calls to this Save method, and you’re done. It’s pretty sweet when it comes together</a:t>
-            </a:r>
-            <a:r>
-              <a:rPr lang="en-US" sz="1200" kern="1200" dirty="0" smtClean="0">
-                <a:solidFill>
-                  <a:schemeClr val="tx1"/>
-                </a:solidFill>
-                <a:effectLst/>
-                <a:latin typeface="+mn-lt"/>
-                <a:ea typeface="+mn-ea"/>
-                <a:cs typeface="+mn-cs"/>
-              </a:rPr>
-              <a:t>.</a:t>
-            </a:r>
-          </a:p>
-          <a:p>
+              <a:t>In</a:t>
+            </a:r>
+            <a:r>
+              <a:rPr lang="en-US" sz="1200" kern="1200" baseline="0" dirty="0" smtClean="0">
+                <a:solidFill>
+                  <a:schemeClr val="tx1"/>
+                </a:solidFill>
+                <a:effectLst/>
+                <a:latin typeface="+mn-lt"/>
+                <a:ea typeface="+mn-ea"/>
+                <a:cs typeface="+mn-cs"/>
+              </a:rPr>
+              <a:t> addition to managing primary keys with the </a:t>
+            </a:r>
+            <a:r>
+              <a:rPr lang="en-US" sz="1200" kern="1200" baseline="0" dirty="0" err="1" smtClean="0">
+                <a:solidFill>
+                  <a:schemeClr val="tx1"/>
+                </a:solidFill>
+                <a:effectLst/>
+                <a:latin typeface="+mn-lt"/>
+                <a:ea typeface="+mn-ea"/>
+                <a:cs typeface="+mn-cs"/>
+              </a:rPr>
+              <a:t>IdSequencer</a:t>
+            </a:r>
+            <a:r>
+              <a:rPr lang="en-US" sz="1200" kern="1200" baseline="0" dirty="0" smtClean="0">
+                <a:solidFill>
+                  <a:schemeClr val="tx1"/>
+                </a:solidFill>
+                <a:effectLst/>
+                <a:latin typeface="+mn-lt"/>
+                <a:ea typeface="+mn-ea"/>
+                <a:cs typeface="+mn-cs"/>
+              </a:rPr>
+              <a:t>, the main benefit of using helpers to save these objects, rather than calling ORM directly, is that it gives you extension points to add test-specific logic. It doesn't happen a lot, but there are times when I need to massage test data in a certain way before saving it. Having this wrapper in place gives a consistent place to do that.</a:t>
+            </a:r>
             <a:endParaRPr lang="en-US" sz="1200" kern="1200" dirty="0" smtClean="0">
               <a:solidFill>
                 <a:schemeClr val="tx1"/>
@@ -14339,54 +14359,6 @@
             </a:endParaRPr>
           </a:p>
           <a:p>
-            <a:r>
-              <a:rPr lang="en-US" sz="1200" kern="1200" dirty="0" smtClean="0">
-                <a:solidFill>
-                  <a:schemeClr val="tx1"/>
-                </a:solidFill>
-                <a:effectLst/>
-                <a:latin typeface="+mn-lt"/>
-                <a:ea typeface="+mn-ea"/>
-                <a:cs typeface="+mn-cs"/>
-              </a:rPr>
-              <a:t>In</a:t>
-            </a:r>
-            <a:r>
-              <a:rPr lang="en-US" sz="1200" kern="1200" baseline="0" dirty="0" smtClean="0">
-                <a:solidFill>
-                  <a:schemeClr val="tx1"/>
-                </a:solidFill>
-                <a:effectLst/>
-                <a:latin typeface="+mn-lt"/>
-                <a:ea typeface="+mn-ea"/>
-                <a:cs typeface="+mn-cs"/>
-              </a:rPr>
-              <a:t> addition to managing primary keys with the </a:t>
-            </a:r>
-            <a:r>
-              <a:rPr lang="en-US" sz="1200" kern="1200" baseline="0" dirty="0" err="1" smtClean="0">
-                <a:solidFill>
-                  <a:schemeClr val="tx1"/>
-                </a:solidFill>
-                <a:effectLst/>
-                <a:latin typeface="+mn-lt"/>
-                <a:ea typeface="+mn-ea"/>
-                <a:cs typeface="+mn-cs"/>
-              </a:rPr>
-              <a:t>IdSequencer</a:t>
-            </a:r>
-            <a:r>
-              <a:rPr lang="en-US" sz="1200" kern="1200" baseline="0" dirty="0" smtClean="0">
-                <a:solidFill>
-                  <a:schemeClr val="tx1"/>
-                </a:solidFill>
-                <a:effectLst/>
-                <a:latin typeface="+mn-lt"/>
-                <a:ea typeface="+mn-ea"/>
-                <a:cs typeface="+mn-cs"/>
-              </a:rPr>
-              <a:t>, the main benefit of using your helpers to save these objects, rather than just calling the ORM directly in your test, is that it gives you extension points to add test-specific logic. It doesn't happen a lot, but there are certainly times when I need to massage the test data in a certain way before saving it. Having this wrapper in place gives me a consistent place to do that.</a:t>
-            </a:r>
             <a:endParaRPr lang="en-US" sz="1200" kern="1200" dirty="0" smtClean="0">
               <a:solidFill>
                 <a:schemeClr val="tx1"/>
@@ -14398,6 +14370,102 @@
             </a:endParaRPr>
           </a:p>
           <a:p>
+            <a:r>
+              <a:rPr lang="en-US" sz="1200" kern="1200" dirty="0" smtClean="0">
+                <a:solidFill>
+                  <a:schemeClr val="tx1"/>
+                </a:solidFill>
+                <a:effectLst/>
+                <a:latin typeface="+mn-lt"/>
+                <a:ea typeface="+mn-ea"/>
+                <a:cs typeface="+mn-cs"/>
+              </a:rPr>
+              <a:t>Also,</a:t>
+            </a:r>
+            <a:r>
+              <a:rPr lang="en-US" sz="1200" kern="1200" baseline="0" dirty="0" smtClean="0">
+                <a:solidFill>
+                  <a:schemeClr val="tx1"/>
+                </a:solidFill>
+                <a:effectLst/>
+                <a:latin typeface="+mn-lt"/>
+                <a:ea typeface="+mn-ea"/>
+                <a:cs typeface="+mn-cs"/>
+              </a:rPr>
+              <a:t> </a:t>
+            </a:r>
+            <a:r>
+              <a:rPr lang="en-US" sz="1200" kern="1200" dirty="0" smtClean="0">
+                <a:solidFill>
+                  <a:schemeClr val="tx1"/>
+                </a:solidFill>
+                <a:effectLst/>
+                <a:latin typeface="+mn-lt"/>
+                <a:ea typeface="+mn-ea"/>
+                <a:cs typeface="+mn-cs"/>
+              </a:rPr>
+              <a:t>if </a:t>
+            </a:r>
+            <a:r>
+              <a:rPr lang="en-US" sz="1200" kern="1200" dirty="0" smtClean="0">
+                <a:solidFill>
+                  <a:schemeClr val="tx1"/>
+                </a:solidFill>
+                <a:effectLst/>
+                <a:latin typeface="+mn-lt"/>
+                <a:ea typeface="+mn-ea"/>
+                <a:cs typeface="+mn-cs"/>
+              </a:rPr>
+              <a:t>you follow this pattern then you can </a:t>
+            </a:r>
+            <a:r>
+              <a:rPr lang="en-US" sz="1200" kern="1200" dirty="0" smtClean="0">
+                <a:solidFill>
+                  <a:schemeClr val="tx1"/>
+                </a:solidFill>
+                <a:effectLst/>
+                <a:latin typeface="+mn-lt"/>
+                <a:ea typeface="+mn-ea"/>
+                <a:cs typeface="+mn-cs"/>
+              </a:rPr>
+              <a:t>use the same setup statements for both unit AND integration tests. The only difference is a </a:t>
+            </a:r>
+            <a:r>
+              <a:rPr lang="en-US" sz="1200" kern="1200" baseline="0" dirty="0" smtClean="0">
+                <a:solidFill>
+                  <a:schemeClr val="tx1"/>
+                </a:solidFill>
+                <a:effectLst/>
+                <a:latin typeface="+mn-lt"/>
+                <a:ea typeface="+mn-ea"/>
+                <a:cs typeface="+mn-cs"/>
+              </a:rPr>
+              <a:t>few calls to the Save methods. </a:t>
+            </a:r>
+            <a:r>
+              <a:rPr lang="en-US" sz="1200" kern="1200" dirty="0" smtClean="0">
+                <a:solidFill>
+                  <a:schemeClr val="tx1"/>
+                </a:solidFill>
+                <a:effectLst/>
+                <a:latin typeface="+mn-lt"/>
+                <a:ea typeface="+mn-ea"/>
+                <a:cs typeface="+mn-cs"/>
+              </a:rPr>
+              <a:t>It’s really sweet when this comes together</a:t>
+            </a:r>
+            <a:r>
+              <a:rPr lang="en-US" sz="1200" kern="1200" baseline="0" dirty="0" smtClean="0">
+                <a:solidFill>
+                  <a:schemeClr val="tx1"/>
+                </a:solidFill>
+                <a:effectLst/>
+                <a:latin typeface="+mn-lt"/>
+                <a:ea typeface="+mn-ea"/>
+                <a:cs typeface="+mn-cs"/>
+              </a:rPr>
+              <a:t>.</a:t>
+            </a:r>
             <a:endParaRPr lang="en-US" sz="1200" kern="1200" dirty="0" smtClean="0">
               <a:solidFill>
                 <a:schemeClr val="tx1"/>
@@ -14409,20 +14477,6 @@
             </a:endParaRPr>
           </a:p>
           <a:p>
-            <a:r>
-              <a:rPr lang="en-US" sz="1200" kern="1200" dirty="0" smtClean="0">
-                <a:solidFill>
-                  <a:schemeClr val="tx1"/>
-                </a:solidFill>
-                <a:effectLst/>
-                <a:latin typeface="+mn-lt"/>
-                <a:ea typeface="+mn-ea"/>
-                <a:cs typeface="+mn-cs"/>
-              </a:rPr>
-              <a:t>But how do prevent this test data from lingering in the database when the test run is over?</a:t>
-            </a:r>
-          </a:p>
-          <a:p>
             <a:endParaRPr lang="en-US" sz="1200" kern="1200" dirty="0" smtClean="0">
               <a:solidFill>
                 <a:schemeClr val="tx1"/>
@@ -14444,7 +14498,19 @@
                 <a:ea typeface="+mn-ea"/>
                 <a:cs typeface="+mn-cs"/>
               </a:rPr>
-              <a:t>One possibility is to reset the database to a known state at the start of each test run. This works, but I don’t recommend it. One reason is that it’s a massive pain to maintain that baseline backup every time the schema changes or new data is added. Another reason is that I use the same database for unit tests as I do for manual testing. It really sucks to spend a bunch of time crafting data for a manual test and then lose it because you accidently ran an integration test that wiped the slate clean. </a:t>
+              <a:t>(click</a:t>
+            </a:r>
+            <a:r>
+              <a:rPr lang="en-US" sz="1200" kern="1200" baseline="0" dirty="0" smtClean="0">
+                <a:solidFill>
+                  <a:schemeClr val="tx1"/>
+                </a:solidFill>
+                <a:effectLst/>
+                <a:latin typeface="+mn-lt"/>
+                <a:ea typeface="+mn-ea"/>
+                <a:cs typeface="+mn-cs"/>
+              </a:rPr>
+              <a:t> for "how to clean up")</a:t>
             </a:r>
             <a:endParaRPr lang="en-US" sz="1200" kern="1200" dirty="0">
               <a:solidFill>
@@ -14538,20 +14604,6 @@
           <a:bodyPr/>
           <a:lstStyle/>
           <a:p>
-            <a:r>
-              <a:rPr lang="en-US" sz="1200" kern="1200" dirty="0" smtClean="0">
-                <a:solidFill>
-                  <a:schemeClr val="tx1"/>
-                </a:solidFill>
-                <a:effectLst/>
-                <a:latin typeface="+mn-lt"/>
-                <a:ea typeface="+mn-ea"/>
-                <a:cs typeface="+mn-cs"/>
-              </a:rPr>
-              <a:t>Another option is to start a database transaction when each test starts, and then roll that transaction back when the test is over.</a:t>
-            </a:r>
-          </a:p>
-          <a:p>
             <a:endParaRPr lang="en-US" sz="1200" kern="1200" dirty="0" smtClean="0">
               <a:solidFill>
                 <a:schemeClr val="tx1"/>
@@ -14573,20 +14625,21 @@
                 <a:ea typeface="+mn-ea"/>
                 <a:cs typeface="+mn-cs"/>
               </a:rPr>
-              <a:t>Years ago I wrote a custom </a:t>
-            </a:r>
-            <a:r>
-              <a:rPr lang="en-US" sz="1200" kern="1200" dirty="0" err="1" smtClean="0">
-                <a:solidFill>
-                  <a:schemeClr val="tx1"/>
-                </a:solidFill>
-                <a:effectLst/>
-                <a:latin typeface="+mn-lt"/>
-                <a:ea typeface="+mn-ea"/>
-                <a:cs typeface="+mn-cs"/>
-              </a:rPr>
-              <a:t>NUnit</a:t>
-            </a:r>
+              <a:t>But how do prevent this test data from lingering in the database when the test run is over?</a:t>
+            </a:r>
+          </a:p>
+          <a:p>
+            <a:endParaRPr lang="en-US" sz="1200" kern="1200" dirty="0" smtClean="0">
+              <a:solidFill>
+                <a:schemeClr val="tx1"/>
+              </a:solidFill>
+              <a:effectLst/>
+              <a:latin typeface="+mn-lt"/>
+              <a:ea typeface="+mn-ea"/>
+              <a:cs typeface="+mn-cs"/>
+            </a:endParaRPr>
+          </a:p>
+          <a:p>
             <a:r>
               <a:rPr lang="en-US" sz="1200" kern="1200" dirty="0" smtClean="0">
                 <a:solidFill>
@@ -14597,21 +14650,17 @@
                 <a:ea typeface="+mn-ea"/>
                 <a:cs typeface="+mn-cs"/>
               </a:rPr>
-              <a:t> attribute called Rollback that does this for us. Any test that has this attribute is automatically executed inside of a transaction that is discarded when the test finishes. The implementation for this is on my GitHub, but at this point it’s like seven years old. There are probably newer and better ways of doing it now, but you’re welcome to copy my approach if you’re using </a:t>
-            </a:r>
-            <a:r>
-              <a:rPr lang="en-US" sz="1200" kern="1200" dirty="0" err="1" smtClean="0">
-                <a:solidFill>
-                  <a:schemeClr val="tx1"/>
-                </a:solidFill>
-                <a:effectLst/>
-                <a:latin typeface="+mn-lt"/>
-                <a:ea typeface="+mn-ea"/>
-                <a:cs typeface="+mn-cs"/>
-              </a:rPr>
-              <a:t>NUnit</a:t>
-            </a:r>
-            <a:endParaRPr lang="en-US" dirty="0"/>
+              <a:t>One possibility is to reset the database to a known state at the start of each test run. This works, but I don’t recommend it. One reason is that it’s a massive pain to maintain that baseline backup every time the schema changes or new data is added. Another reason is that I use the same database for unit tests as I do for manual testing. It really sucks to spend a bunch of time crafting data for a manual test and then lose it because you accidently ran an integration test that wiped the slate clean. </a:t>
+            </a:r>
+            <a:endParaRPr lang="en-US" sz="1200" kern="1200" dirty="0">
+              <a:solidFill>
+                <a:schemeClr val="tx1"/>
+              </a:solidFill>
+              <a:effectLst/>
+              <a:latin typeface="+mn-lt"/>
+              <a:ea typeface="+mn-ea"/>
+              <a:cs typeface="+mn-cs"/>
+            </a:endParaRPr>
           </a:p>
         </p:txBody>
       </p:sp>
@@ -14641,7 +14690,7 @@
     </p:spTree>
     <p:extLst>
       <p:ext uri="{BB962C8B-B14F-4D97-AF65-F5344CB8AC3E}">
-        <p14:creationId xmlns:p14="http://schemas.microsoft.com/office/powerpoint/2010/main" val="3266683685"/>
+        <p14:creationId xmlns:p14="http://schemas.microsoft.com/office/powerpoint/2010/main" val="1385556920"/>
       </p:ext>
     </p:extLst>
   </p:cSld>
@@ -14705,9 +14754,11 @@
                 <a:ea typeface="+mn-ea"/>
                 <a:cs typeface="+mn-cs"/>
               </a:rPr>
-              <a:t>As an example of how powerful these techniques can be, let’s first revisit that nasty chunk of setup code I showed at the start…</a:t>
-            </a:r>
-            <a:endParaRPr lang="en-US" sz="1200" kern="1200" dirty="0">
+              <a:t>Another option is to start a database transaction when each test starts, and then roll that transaction back when the test is over.</a:t>
+            </a:r>
+          </a:p>
+          <a:p>
+            <a:endParaRPr lang="en-US" sz="1200" kern="1200" dirty="0" smtClean="0">
               <a:solidFill>
                 <a:schemeClr val="tx1"/>
               </a:solidFill>
@@ -14717,6 +14768,57 @@
               <a:cs typeface="+mn-cs"/>
             </a:endParaRPr>
           </a:p>
+          <a:p>
+            <a:r>
+              <a:rPr lang="en-US" sz="1200" kern="1200" dirty="0" smtClean="0">
+                <a:solidFill>
+                  <a:schemeClr val="tx1"/>
+                </a:solidFill>
+                <a:effectLst/>
+                <a:latin typeface="+mn-lt"/>
+                <a:ea typeface="+mn-ea"/>
+                <a:cs typeface="+mn-cs"/>
+              </a:rPr>
+              <a:t>Years ago I wrote a custom </a:t>
+            </a:r>
+            <a:r>
+              <a:rPr lang="en-US" sz="1200" kern="1200" dirty="0" err="1" smtClean="0">
+                <a:solidFill>
+                  <a:schemeClr val="tx1"/>
+                </a:solidFill>
+                <a:effectLst/>
+                <a:latin typeface="+mn-lt"/>
+                <a:ea typeface="+mn-ea"/>
+                <a:cs typeface="+mn-cs"/>
+              </a:rPr>
+              <a:t>NUnit</a:t>
+            </a:r>
+            <a:r>
+              <a:rPr lang="en-US" sz="1200" kern="1200" dirty="0" smtClean="0">
+                <a:solidFill>
+                  <a:schemeClr val="tx1"/>
+                </a:solidFill>
+                <a:effectLst/>
+                <a:latin typeface="+mn-lt"/>
+                <a:ea typeface="+mn-ea"/>
+                <a:cs typeface="+mn-cs"/>
+              </a:rPr>
+              <a:t> attribute called Rollback that does this for us. Any test that has this attribute is automatically executed inside of a transaction that is discarded when the test finishes. The implementation for this is on my GitHub, but at this point it’s like seven years old. There are probably newer and better ways of doing it now, but you’re welcome to copy my approach if you’re using </a:t>
+            </a:r>
+            <a:r>
+              <a:rPr lang="en-US" sz="1200" kern="1200" dirty="0" err="1" smtClean="0">
+                <a:solidFill>
+                  <a:schemeClr val="tx1"/>
+                </a:solidFill>
+                <a:effectLst/>
+                <a:latin typeface="+mn-lt"/>
+                <a:ea typeface="+mn-ea"/>
+                <a:cs typeface="+mn-cs"/>
+              </a:rPr>
+              <a:t>NUnit</a:t>
+            </a:r>
+            <a:endParaRPr lang="en-US" dirty="0"/>
+          </a:p>
         </p:txBody>
       </p:sp>
       <p:sp>
@@ -14745,7 +14847,7 @@
     </p:spTree>
     <p:extLst>
       <p:ext uri="{BB962C8B-B14F-4D97-AF65-F5344CB8AC3E}">
-        <p14:creationId xmlns:p14="http://schemas.microsoft.com/office/powerpoint/2010/main" val="621233375"/>
+        <p14:creationId xmlns:p14="http://schemas.microsoft.com/office/powerpoint/2010/main" val="3266683685"/>
       </p:ext>
     </p:extLst>
   </p:cSld>
@@ -14799,7 +14901,27 @@
           <a:bodyPr/>
           <a:lstStyle/>
           <a:p>
-            <a:endParaRPr lang="en-US" dirty="0"/>
+            <a:r>
+              <a:rPr lang="en-US" sz="1200" kern="1200" dirty="0" smtClean="0">
+                <a:solidFill>
+                  <a:schemeClr val="tx1"/>
+                </a:solidFill>
+                <a:effectLst/>
+                <a:latin typeface="+mn-lt"/>
+                <a:ea typeface="+mn-ea"/>
+                <a:cs typeface="+mn-cs"/>
+              </a:rPr>
+              <a:t>As an example of how powerful these techniques can be, let’s first revisit that nasty chunk of setup code I showed at the start…</a:t>
+            </a:r>
+            <a:endParaRPr lang="en-US" sz="1200" kern="1200" dirty="0">
+              <a:solidFill>
+                <a:schemeClr val="tx1"/>
+              </a:solidFill>
+              <a:effectLst/>
+              <a:latin typeface="+mn-lt"/>
+              <a:ea typeface="+mn-ea"/>
+              <a:cs typeface="+mn-cs"/>
+            </a:endParaRPr>
           </a:p>
         </p:txBody>
       </p:sp>
@@ -14829,7 +14951,7 @@
     </p:spTree>
     <p:extLst>
       <p:ext uri="{BB962C8B-B14F-4D97-AF65-F5344CB8AC3E}">
-        <p14:creationId xmlns:p14="http://schemas.microsoft.com/office/powerpoint/2010/main" val="871096793"/>
+        <p14:creationId xmlns:p14="http://schemas.microsoft.com/office/powerpoint/2010/main" val="621233375"/>
       </p:ext>
     </p:extLst>
   </p:cSld>
@@ -15232,62 +15354,7 @@
           <a:bodyPr/>
           <a:lstStyle/>
           <a:p>
-            <a:pPr marL="0" marR="0" lvl="0" indent="0" algn="l" defTabSz="914400" rtl="0" eaLnBrk="1" fontAlgn="auto" latinLnBrk="0" hangingPunct="1">
-              <a:lnSpc>
-                <a:spcPct val="100000"/>
-              </a:lnSpc>
-              <a:spcBef>
-                <a:spcPts val="0"/>
-              </a:spcBef>
-              <a:spcAft>
-                <a:spcPts val="0"/>
-              </a:spcAft>
-              <a:buClrTx/>
-              <a:buSzTx/>
-              <a:buFontTx/>
-              <a:buNone/>
-              <a:tabLst/>
-              <a:defRPr/>
-            </a:pPr>
-            <a:r>
-              <a:rPr lang="en-US" sz="1200" kern="1200" dirty="0" smtClean="0">
-                <a:solidFill>
-                  <a:schemeClr val="tx1"/>
-                </a:solidFill>
-                <a:effectLst/>
-                <a:latin typeface="+mn-lt"/>
-                <a:ea typeface="+mn-ea"/>
-                <a:cs typeface="+mn-cs"/>
-              </a:rPr>
-              <a:t>All three </a:t>
-            </a:r>
-            <a:r>
-              <a:rPr lang="en-US" sz="1200" kern="1200" dirty="0" err="1" smtClean="0">
-                <a:solidFill>
-                  <a:schemeClr val="tx1"/>
-                </a:solidFill>
-                <a:effectLst/>
-                <a:latin typeface="+mn-lt"/>
-                <a:ea typeface="+mn-ea"/>
-                <a:cs typeface="+mn-cs"/>
-              </a:rPr>
-              <a:t>screenfulls</a:t>
-            </a:r>
-            <a:r>
-              <a:rPr lang="en-US" sz="1200" kern="1200" dirty="0" smtClean="0">
-                <a:solidFill>
-                  <a:schemeClr val="tx1"/>
-                </a:solidFill>
-                <a:effectLst/>
-                <a:latin typeface="+mn-lt"/>
-                <a:ea typeface="+mn-ea"/>
-                <a:cs typeface="+mn-cs"/>
-              </a:rPr>
-              <a:t> of it.</a:t>
-            </a:r>
-          </a:p>
-          <a:p>
-            <a:endParaRPr lang="en-US" dirty="0" smtClean="0"/>
+            <a:endParaRPr lang="en-US" dirty="0"/>
           </a:p>
         </p:txBody>
       </p:sp>
@@ -15317,7 +15384,7 @@
     </p:spTree>
     <p:extLst>
       <p:ext uri="{BB962C8B-B14F-4D97-AF65-F5344CB8AC3E}">
-        <p14:creationId xmlns:p14="http://schemas.microsoft.com/office/powerpoint/2010/main" val="2885101328"/>
+        <p14:creationId xmlns:p14="http://schemas.microsoft.com/office/powerpoint/2010/main" val="871096793"/>
       </p:ext>
     </p:extLst>
   </p:cSld>
@@ -15371,6 +15438,23 @@
           <a:bodyPr/>
           <a:lstStyle/>
           <a:p>
+            <a:pPr marL="0" marR="0" lvl="0" indent="0" algn="l" defTabSz="914400" rtl="0" eaLnBrk="1" fontAlgn="auto" latinLnBrk="0" hangingPunct="1">
+              <a:lnSpc>
+                <a:spcPct val="100000"/>
+              </a:lnSpc>
+              <a:spcBef>
+                <a:spcPts val="0"/>
+              </a:spcBef>
+              <a:spcAft>
+                <a:spcPts val="0"/>
+              </a:spcAft>
+              <a:buClrTx/>
+              <a:buSzTx/>
+              <a:buFontTx/>
+              <a:buNone/>
+              <a:tabLst/>
+              <a:defRPr/>
+            </a:pPr>
             <a:r>
               <a:rPr lang="en-US" sz="1200" kern="1200" dirty="0" smtClean="0">
                 <a:solidFill>
@@ -15381,21 +15465,20 @@
                 <a:ea typeface="+mn-ea"/>
                 <a:cs typeface="+mn-cs"/>
               </a:rPr>
-              <a:t>Here’s that same chunk of code, cleaned up and rewritten using Test Helpers. Most of the values and objects being created were irrelevant dependencies that didn’t impact the outcomes. After pushing all of that stuff into helpers, this is all that’s left and it’s way, way more readable.</a:t>
-            </a:r>
-          </a:p>
-          <a:p>
-            <a:endParaRPr lang="en-US" sz="1200" kern="1200" dirty="0" smtClean="0">
-              <a:solidFill>
-                <a:schemeClr val="tx1"/>
-              </a:solidFill>
-              <a:effectLst/>
-              <a:latin typeface="+mn-lt"/>
-              <a:ea typeface="+mn-ea"/>
-              <a:cs typeface="+mn-cs"/>
-            </a:endParaRPr>
-          </a:p>
-          <a:p>
+              <a:t>All three </a:t>
+            </a:r>
+            <a:r>
+              <a:rPr lang="en-US" sz="1200" kern="1200" dirty="0" err="1" smtClean="0">
+                <a:solidFill>
+                  <a:schemeClr val="tx1"/>
+                </a:solidFill>
+                <a:effectLst/>
+                <a:latin typeface="+mn-lt"/>
+                <a:ea typeface="+mn-ea"/>
+                <a:cs typeface="+mn-cs"/>
+              </a:rPr>
+              <a:t>screenfulls</a:t>
+            </a:r>
             <a:r>
               <a:rPr lang="en-US" sz="1200" kern="1200" dirty="0" smtClean="0">
                 <a:solidFill>
@@ -15406,17 +15489,11 @@
                 <a:ea typeface="+mn-ea"/>
                 <a:cs typeface="+mn-cs"/>
               </a:rPr>
-              <a:t>I’ve said it before and I’ll say it again; the single most important thing you can do is build a good helper library and stop creating data by hand.</a:t>
-            </a:r>
-            <a:endParaRPr lang="en-US" sz="1200" kern="1200" dirty="0">
-              <a:solidFill>
-                <a:schemeClr val="tx1"/>
-              </a:solidFill>
-              <a:effectLst/>
-              <a:latin typeface="+mn-lt"/>
-              <a:ea typeface="+mn-ea"/>
-              <a:cs typeface="+mn-cs"/>
-            </a:endParaRPr>
+              <a:t> of it.</a:t>
+            </a:r>
+          </a:p>
+          <a:p>
+            <a:endParaRPr lang="en-US" dirty="0" smtClean="0"/>
           </a:p>
         </p:txBody>
       </p:sp>
@@ -15446,7 +15523,7 @@
     </p:spTree>
     <p:extLst>
       <p:ext uri="{BB962C8B-B14F-4D97-AF65-F5344CB8AC3E}">
-        <p14:creationId xmlns:p14="http://schemas.microsoft.com/office/powerpoint/2010/main" val="2408674174"/>
+        <p14:creationId xmlns:p14="http://schemas.microsoft.com/office/powerpoint/2010/main" val="2885101328"/>
       </p:ext>
     </p:extLst>
   </p:cSld>
@@ -15510,7 +15587,7 @@
                 <a:ea typeface="+mn-ea"/>
                 <a:cs typeface="+mn-cs"/>
               </a:rPr>
-              <a:t>To wrap up, I have some quick suggestions for how to get started with these patterns in your own code.</a:t>
+              <a:t>Here’s that same chunk of code, cleaned up and rewritten using Test Helpers. Most of the values and objects being created were irrelevant dependencies that didn’t impact the outcomes. After pushing all of that stuff into helpers, this is all that’s left and it’s way, way more readable.</a:t>
             </a:r>
           </a:p>
           <a:p>
@@ -15535,35 +15612,9 @@
                 <a:ea typeface="+mn-ea"/>
                 <a:cs typeface="+mn-cs"/>
               </a:rPr>
-              <a:t>First, start by creating helpers for your simple objects first, the ones that don’t have lots of dependencies or child data. Then move up to more complex objects, delegating to the simple helpers as needed. If you try and start with that huge, massive, ancient beast that lives at the heart of your legacy system, it’s </a:t>
-            </a:r>
-            <a:r>
-              <a:rPr lang="en-US" sz="1200" kern="1200" dirty="0" err="1" smtClean="0">
-                <a:solidFill>
-                  <a:schemeClr val="tx1"/>
-                </a:solidFill>
-                <a:effectLst/>
-                <a:latin typeface="+mn-lt"/>
-                <a:ea typeface="+mn-ea"/>
-                <a:cs typeface="+mn-cs"/>
-              </a:rPr>
-              <a:t>gonna</a:t>
-            </a:r>
-            <a:r>
-              <a:rPr lang="en-US" sz="1200" kern="1200" dirty="0" smtClean="0">
-                <a:solidFill>
-                  <a:schemeClr val="tx1"/>
-                </a:solidFill>
-                <a:effectLst/>
-                <a:latin typeface="+mn-lt"/>
-                <a:ea typeface="+mn-ea"/>
-                <a:cs typeface="+mn-cs"/>
-              </a:rPr>
-              <a:t> hurt.</a:t>
-            </a:r>
-          </a:p>
-          <a:p>
-            <a:endParaRPr lang="en-US" sz="1200" kern="1200" dirty="0" smtClean="0">
+              <a:t>I’ve said it before and I’ll say it again; the single most important thing you can do is build a good helper library and stop creating data by hand.</a:t>
+            </a:r>
+            <a:endParaRPr lang="en-US" sz="1200" kern="1200" dirty="0">
               <a:solidFill>
                 <a:schemeClr val="tx1"/>
               </a:solidFill>
@@ -15573,104 +15624,6 @@
               <a:cs typeface="+mn-cs"/>
             </a:endParaRPr>
           </a:p>
-          <a:p>
-            <a:r>
-              <a:rPr lang="en-US" sz="1200" kern="1200" dirty="0" smtClean="0">
-                <a:solidFill>
-                  <a:schemeClr val="tx1"/>
-                </a:solidFill>
-                <a:effectLst/>
-                <a:latin typeface="+mn-lt"/>
-                <a:ea typeface="+mn-ea"/>
-                <a:cs typeface="+mn-cs"/>
-              </a:rPr>
-              <a:t>Second, continually refactor your helpers as needed. Remember that test code </a:t>
-            </a:r>
-            <a:r>
-              <a:rPr lang="en-US" sz="1200" i="1" kern="1200" dirty="0" smtClean="0">
-                <a:solidFill>
-                  <a:schemeClr val="tx1"/>
-                </a:solidFill>
-                <a:effectLst/>
-                <a:latin typeface="+mn-lt"/>
-                <a:ea typeface="+mn-ea"/>
-                <a:cs typeface="+mn-cs"/>
-              </a:rPr>
-              <a:t>is </a:t>
-            </a:r>
-            <a:r>
-              <a:rPr lang="en-US" sz="1200" kern="1200" dirty="0" smtClean="0">
-                <a:solidFill>
-                  <a:schemeClr val="tx1"/>
-                </a:solidFill>
-                <a:effectLst/>
-                <a:latin typeface="+mn-lt"/>
-                <a:ea typeface="+mn-ea"/>
-                <a:cs typeface="+mn-cs"/>
-              </a:rPr>
-              <a:t>“real code”; keep it clean and tidy just like you would anything else.</a:t>
-            </a:r>
-          </a:p>
-          <a:p>
-            <a:endParaRPr lang="en-US" sz="1200" kern="1200" dirty="0" smtClean="0">
-              <a:solidFill>
-                <a:schemeClr val="tx1"/>
-              </a:solidFill>
-              <a:effectLst/>
-              <a:latin typeface="+mn-lt"/>
-              <a:ea typeface="+mn-ea"/>
-              <a:cs typeface="+mn-cs"/>
-            </a:endParaRPr>
-          </a:p>
-          <a:p>
-            <a:r>
-              <a:rPr lang="en-US" sz="1200" kern="1200" dirty="0" smtClean="0">
-                <a:solidFill>
-                  <a:schemeClr val="tx1"/>
-                </a:solidFill>
-                <a:effectLst/>
-                <a:latin typeface="+mn-lt"/>
-                <a:ea typeface="+mn-ea"/>
-                <a:cs typeface="+mn-cs"/>
-              </a:rPr>
-              <a:t>Lastly, the sooner you start implementing these patterns, the sooner you’ll notice the payoff. There </a:t>
-            </a:r>
-            <a:r>
-              <a:rPr lang="en-US" sz="1200" i="1" kern="1200" dirty="0" smtClean="0">
-                <a:solidFill>
-                  <a:schemeClr val="tx1"/>
-                </a:solidFill>
-                <a:effectLst/>
-                <a:latin typeface="+mn-lt"/>
-                <a:ea typeface="+mn-ea"/>
-                <a:cs typeface="+mn-cs"/>
-              </a:rPr>
-              <a:t>is </a:t>
-            </a:r>
-            <a:r>
-              <a:rPr lang="en-US" sz="1200" kern="1200" dirty="0" smtClean="0">
-                <a:solidFill>
-                  <a:schemeClr val="tx1"/>
-                </a:solidFill>
-                <a:effectLst/>
-                <a:latin typeface="+mn-lt"/>
-                <a:ea typeface="+mn-ea"/>
-                <a:cs typeface="+mn-cs"/>
-              </a:rPr>
-              <a:t>an investment to add these to a legacy system, but the promised land of clean, simple unit AND integration tests is totally worth it.</a:t>
-            </a:r>
-          </a:p>
-          <a:p>
-            <a:endParaRPr lang="en-US" sz="1200" kern="1200" dirty="0" smtClean="0">
-              <a:solidFill>
-                <a:schemeClr val="tx1"/>
-              </a:solidFill>
-              <a:effectLst/>
-              <a:latin typeface="+mn-lt"/>
-              <a:ea typeface="+mn-ea"/>
-              <a:cs typeface="+mn-cs"/>
-            </a:endParaRPr>
-          </a:p>
         </p:txBody>
       </p:sp>
       <p:sp>
@@ -15699,7 +15652,7 @@
     </p:spTree>
     <p:extLst>
       <p:ext uri="{BB962C8B-B14F-4D97-AF65-F5344CB8AC3E}">
-        <p14:creationId xmlns:p14="http://schemas.microsoft.com/office/powerpoint/2010/main" val="4116676846"/>
+        <p14:creationId xmlns:p14="http://schemas.microsoft.com/office/powerpoint/2010/main" val="2408674174"/>
       </p:ext>
     </p:extLst>
   </p:cSld>
@@ -15763,45 +15716,7 @@
                 <a:ea typeface="+mn-ea"/>
                 <a:cs typeface="+mn-cs"/>
               </a:rPr>
-              <a:t>And that brings us to the end of this session. Here are the 4 keys to effective test setup as well as links to these slides on </a:t>
-            </a:r>
-            <a:r>
-              <a:rPr lang="en-US" sz="1200" kern="1200" dirty="0" err="1" smtClean="0">
-                <a:solidFill>
-                  <a:schemeClr val="tx1"/>
-                </a:solidFill>
-                <a:effectLst/>
-                <a:latin typeface="+mn-lt"/>
-                <a:ea typeface="+mn-ea"/>
-                <a:cs typeface="+mn-cs"/>
-              </a:rPr>
-              <a:t>Github</a:t>
-            </a:r>
-            <a:r>
-              <a:rPr lang="en-US" sz="1200" kern="1200" dirty="0" smtClean="0">
-                <a:solidFill>
-                  <a:schemeClr val="tx1"/>
-                </a:solidFill>
-                <a:effectLst/>
-                <a:latin typeface="+mn-lt"/>
-                <a:ea typeface="+mn-ea"/>
-                <a:cs typeface="+mn-cs"/>
-              </a:rPr>
-              <a:t>, my website, and my twitter account. If you have any questions or comments I think we have a few minutes right now, or please feel free to seek me out online. </a:t>
-            </a:r>
-          </a:p>
-          <a:p>
-            <a:r>
-              <a:rPr lang="en-US" sz="1200" kern="1200" dirty="0" smtClean="0">
-                <a:solidFill>
-                  <a:schemeClr val="tx1"/>
-                </a:solidFill>
-                <a:effectLst/>
-                <a:latin typeface="+mn-lt"/>
-                <a:ea typeface="+mn-ea"/>
-                <a:cs typeface="+mn-cs"/>
-              </a:rPr>
-              <a:t>THANK YOU!</a:t>
+              <a:t>To wrap up, I have some quick suggestions for how to get started with these patterns in your own code.</a:t>
             </a:r>
           </a:p>
           <a:p>
@@ -15815,6 +15730,153 @@
               <a:cs typeface="+mn-cs"/>
             </a:endParaRPr>
           </a:p>
+          <a:p>
+            <a:r>
+              <a:rPr lang="en-US" sz="1200" kern="1200" dirty="0" smtClean="0">
+                <a:solidFill>
+                  <a:schemeClr val="tx1"/>
+                </a:solidFill>
+                <a:effectLst/>
+                <a:latin typeface="+mn-lt"/>
+                <a:ea typeface="+mn-ea"/>
+                <a:cs typeface="+mn-cs"/>
+              </a:rPr>
+              <a:t>First, start by creating helpers for your simple objects first, the ones that don’t have lots of dependencies or child data. Then move up to more complex objects, delegating to the simple helpers as needed. If you try and start with that huge, massive, ancient beast that lives at the heart of your legacy system, it’s </a:t>
+            </a:r>
+            <a:r>
+              <a:rPr lang="en-US" sz="1200" kern="1200" dirty="0" err="1" smtClean="0">
+                <a:solidFill>
+                  <a:schemeClr val="tx1"/>
+                </a:solidFill>
+                <a:effectLst/>
+                <a:latin typeface="+mn-lt"/>
+                <a:ea typeface="+mn-ea"/>
+                <a:cs typeface="+mn-cs"/>
+              </a:rPr>
+              <a:t>gonna</a:t>
+            </a:r>
+            <a:r>
+              <a:rPr lang="en-US" sz="1200" kern="1200" dirty="0" smtClean="0">
+                <a:solidFill>
+                  <a:schemeClr val="tx1"/>
+                </a:solidFill>
+                <a:effectLst/>
+                <a:latin typeface="+mn-lt"/>
+                <a:ea typeface="+mn-ea"/>
+                <a:cs typeface="+mn-cs"/>
+              </a:rPr>
+              <a:t> hurt.</a:t>
+            </a:r>
+          </a:p>
+          <a:p>
+            <a:endParaRPr lang="en-US" sz="1200" kern="1200" dirty="0" smtClean="0">
+              <a:solidFill>
+                <a:schemeClr val="tx1"/>
+              </a:solidFill>
+              <a:effectLst/>
+              <a:latin typeface="+mn-lt"/>
+              <a:ea typeface="+mn-ea"/>
+              <a:cs typeface="+mn-cs"/>
+            </a:endParaRPr>
+          </a:p>
+          <a:p>
+            <a:r>
+              <a:rPr lang="en-US" sz="1200" kern="1200" dirty="0" smtClean="0">
+                <a:solidFill>
+                  <a:schemeClr val="tx1"/>
+                </a:solidFill>
+                <a:effectLst/>
+                <a:latin typeface="+mn-lt"/>
+                <a:ea typeface="+mn-ea"/>
+                <a:cs typeface="+mn-cs"/>
+              </a:rPr>
+              <a:t>Second, continually refactor your helpers as needed. Remember that test code </a:t>
+            </a:r>
+            <a:r>
+              <a:rPr lang="en-US" sz="1200" i="1" kern="1200" dirty="0" smtClean="0">
+                <a:solidFill>
+                  <a:schemeClr val="tx1"/>
+                </a:solidFill>
+                <a:effectLst/>
+                <a:latin typeface="+mn-lt"/>
+                <a:ea typeface="+mn-ea"/>
+                <a:cs typeface="+mn-cs"/>
+              </a:rPr>
+              <a:t>is </a:t>
+            </a:r>
+            <a:r>
+              <a:rPr lang="en-US" sz="1200" kern="1200" dirty="0" smtClean="0">
+                <a:solidFill>
+                  <a:schemeClr val="tx1"/>
+                </a:solidFill>
+                <a:effectLst/>
+                <a:latin typeface="+mn-lt"/>
+                <a:ea typeface="+mn-ea"/>
+                <a:cs typeface="+mn-cs"/>
+              </a:rPr>
+              <a:t>“real code”; keep it clean and tidy just like you would anything else.</a:t>
+            </a:r>
+          </a:p>
+          <a:p>
+            <a:endParaRPr lang="en-US" sz="1200" kern="1200" dirty="0" smtClean="0">
+              <a:solidFill>
+                <a:schemeClr val="tx1"/>
+              </a:solidFill>
+              <a:effectLst/>
+              <a:latin typeface="+mn-lt"/>
+              <a:ea typeface="+mn-ea"/>
+              <a:cs typeface="+mn-cs"/>
+            </a:endParaRPr>
+          </a:p>
+          <a:p>
+            <a:r>
+              <a:rPr lang="en-US" sz="1200" kern="1200" dirty="0" smtClean="0">
+                <a:solidFill>
+                  <a:schemeClr val="tx1"/>
+                </a:solidFill>
+                <a:effectLst/>
+                <a:latin typeface="+mn-lt"/>
+                <a:ea typeface="+mn-ea"/>
+                <a:cs typeface="+mn-cs"/>
+              </a:rPr>
+              <a:t>Lastly, the sooner you start implementing these patterns, the sooner you’ll notice the payoff. There </a:t>
+            </a:r>
+            <a:r>
+              <a:rPr lang="en-US" sz="1200" i="1" kern="1200" dirty="0" smtClean="0">
+                <a:solidFill>
+                  <a:schemeClr val="tx1"/>
+                </a:solidFill>
+                <a:effectLst/>
+                <a:latin typeface="+mn-lt"/>
+                <a:ea typeface="+mn-ea"/>
+                <a:cs typeface="+mn-cs"/>
+              </a:rPr>
+              <a:t>is </a:t>
+            </a:r>
+            <a:r>
+              <a:rPr lang="en-US" sz="1200" kern="1200" dirty="0" smtClean="0">
+                <a:solidFill>
+                  <a:schemeClr val="tx1"/>
+                </a:solidFill>
+                <a:effectLst/>
+                <a:latin typeface="+mn-lt"/>
+                <a:ea typeface="+mn-ea"/>
+                <a:cs typeface="+mn-cs"/>
+              </a:rPr>
+              <a:t>an investment to add these to a legacy system, but the promised land of clean, simple unit AND integration tests is totally worth it.</a:t>
+            </a:r>
+          </a:p>
+          <a:p>
+            <a:endParaRPr lang="en-US" sz="1200" kern="1200" dirty="0" smtClean="0">
+              <a:solidFill>
+                <a:schemeClr val="tx1"/>
+              </a:solidFill>
+              <a:effectLst/>
+              <a:latin typeface="+mn-lt"/>
+              <a:ea typeface="+mn-ea"/>
+              <a:cs typeface="+mn-cs"/>
+            </a:endParaRPr>
+          </a:p>
         </p:txBody>
       </p:sp>
       <p:sp>
@@ -15835,6 +15897,150 @@
             <a:fld id="{89029652-62E7-43D6-83B5-097D7B7AA5D8}" type="slidenum">
               <a:rPr lang="en-US" smtClean="0"/>
               <a:t>93</a:t>
+            </a:fld>
+            <a:endParaRPr lang="en-US"/>
+          </a:p>
+        </p:txBody>
+      </p:sp>
+    </p:spTree>
+    <p:extLst>
+      <p:ext uri="{BB962C8B-B14F-4D97-AF65-F5344CB8AC3E}">
+        <p14:creationId xmlns:p14="http://schemas.microsoft.com/office/powerpoint/2010/main" val="4116676846"/>
+      </p:ext>
+    </p:extLst>
+  </p:cSld>
+  <p:clrMapOvr>
+    <a:masterClrMapping/>
+  </p:clrMapOvr>
+</p:notes>
+</file>
+
+<file path=ppt/notesSlides/notesSlide94.xml><?xml version="1.0" encoding="utf-8"?>
+<p:notes xmlns:a="http://schemas.openxmlformats.org/drawingml/2006/main" xmlns:r="http://schemas.openxmlformats.org/officeDocument/2006/relationships" xmlns:p="http://schemas.openxmlformats.org/presentationml/2006/main">
+  <p:cSld>
+    <p:spTree>
+      <p:nvGrpSpPr>
+        <p:cNvPr id="1" name=""/>
+        <p:cNvGrpSpPr/>
+        <p:nvPr/>
+      </p:nvGrpSpPr>
+      <p:grpSpPr>
+        <a:xfrm>
+          <a:off x="0" y="0"/>
+          <a:ext cx="0" cy="0"/>
+          <a:chOff x="0" y="0"/>
+          <a:chExt cx="0" cy="0"/>
+        </a:xfrm>
+      </p:grpSpPr>
+      <p:sp>
+        <p:nvSpPr>
+          <p:cNvPr id="2" name="Slide Image Placeholder 1"/>
+          <p:cNvSpPr>
+            <a:spLocks noGrp="1" noRot="1" noChangeAspect="1"/>
+          </p:cNvSpPr>
+          <p:nvPr>
+            <p:ph type="sldImg"/>
+          </p:nvPr>
+        </p:nvSpPr>
+        <p:spPr/>
+      </p:sp>
+      <p:sp>
+        <p:nvSpPr>
+          <p:cNvPr id="3" name="Notes Placeholder 2"/>
+          <p:cNvSpPr>
+            <a:spLocks noGrp="1"/>
+          </p:cNvSpPr>
+          <p:nvPr>
+            <p:ph type="body" idx="1"/>
+          </p:nvPr>
+        </p:nvSpPr>
+        <p:spPr/>
+        <p:txBody>
+          <a:bodyPr/>
+          <a:lstStyle/>
+          <a:p>
+            <a:r>
+              <a:rPr lang="en-US" sz="1200" kern="1200" dirty="0" smtClean="0">
+                <a:solidFill>
+                  <a:schemeClr val="tx1"/>
+                </a:solidFill>
+                <a:effectLst/>
+                <a:latin typeface="+mn-lt"/>
+                <a:ea typeface="+mn-ea"/>
+                <a:cs typeface="+mn-cs"/>
+              </a:rPr>
+              <a:t>And that brings us to the end of this session. Here are the 4 keys to effective test setup as well as links to these slides on </a:t>
+            </a:r>
+            <a:r>
+              <a:rPr lang="en-US" sz="1200" kern="1200" dirty="0" err="1" smtClean="0">
+                <a:solidFill>
+                  <a:schemeClr val="tx1"/>
+                </a:solidFill>
+                <a:effectLst/>
+                <a:latin typeface="+mn-lt"/>
+                <a:ea typeface="+mn-ea"/>
+                <a:cs typeface="+mn-cs"/>
+              </a:rPr>
+              <a:t>Github</a:t>
+            </a:r>
+            <a:r>
+              <a:rPr lang="en-US" sz="1200" kern="1200" dirty="0" smtClean="0">
+                <a:solidFill>
+                  <a:schemeClr val="tx1"/>
+                </a:solidFill>
+                <a:effectLst/>
+                <a:latin typeface="+mn-lt"/>
+                <a:ea typeface="+mn-ea"/>
+                <a:cs typeface="+mn-cs"/>
+              </a:rPr>
+              <a:t>, my website, and my twitter account. If you have any questions or comments I think we have a few minutes right now, or please feel free to seek me out online. </a:t>
+            </a:r>
+          </a:p>
+          <a:p>
+            <a:r>
+              <a:rPr lang="en-US" sz="1200" kern="1200" dirty="0" smtClean="0">
+                <a:solidFill>
+                  <a:schemeClr val="tx1"/>
+                </a:solidFill>
+                <a:effectLst/>
+                <a:latin typeface="+mn-lt"/>
+                <a:ea typeface="+mn-ea"/>
+                <a:cs typeface="+mn-cs"/>
+              </a:rPr>
+              <a:t>THANK YOU!</a:t>
+            </a:r>
+          </a:p>
+          <a:p>
+            <a:endParaRPr lang="en-US" sz="1200" kern="1200" dirty="0" smtClean="0">
+              <a:solidFill>
+                <a:schemeClr val="tx1"/>
+              </a:solidFill>
+              <a:effectLst/>
+              <a:latin typeface="+mn-lt"/>
+              <a:ea typeface="+mn-ea"/>
+              <a:cs typeface="+mn-cs"/>
+            </a:endParaRPr>
+          </a:p>
+        </p:txBody>
+      </p:sp>
+      <p:sp>
+        <p:nvSpPr>
+          <p:cNvPr id="4" name="Slide Number Placeholder 3"/>
+          <p:cNvSpPr>
+            <a:spLocks noGrp="1"/>
+          </p:cNvSpPr>
+          <p:nvPr>
+            <p:ph type="sldNum" sz="quarter" idx="10"/>
+          </p:nvPr>
+        </p:nvSpPr>
+        <p:spPr/>
+        <p:txBody>
+          <a:bodyPr/>
+          <a:lstStyle/>
+          <a:p>
+            <a:fld id="{89029652-62E7-43D6-83B5-097D7B7AA5D8}" type="slidenum">
+              <a:rPr lang="en-US" smtClean="0"/>
+              <a:t>94</a:t>
             </a:fld>
             <a:endParaRPr lang="en-US"/>
           </a:p>
@@ -31730,6 +31936,134 @@
             <p:ph idx="1"/>
           </p:nvPr>
         </p:nvSpPr>
+        <p:spPr>
+          <a:xfrm>
+            <a:off x="838200" y="1825625"/>
+            <a:ext cx="10515600" cy="4357462"/>
+          </a:xfrm>
+        </p:spPr>
+        <p:txBody>
+          <a:bodyPr>
+            <a:normAutofit/>
+          </a:bodyPr>
+          <a:lstStyle/>
+          <a:p>
+            <a:pPr marL="914400" lvl="2" indent="0">
+              <a:buNone/>
+            </a:pPr>
+            <a:r>
+              <a:rPr lang="en-US" dirty="0" smtClean="0"/>
+              <a:t>	</a:t>
+            </a:r>
+          </a:p>
+          <a:p>
+            <a:endParaRPr lang="en-US" dirty="0"/>
+          </a:p>
+        </p:txBody>
+      </p:sp>
+      <p:pic>
+        <p:nvPicPr>
+          <p:cNvPr id="4" name="Picture 3"/>
+          <p:cNvPicPr>
+            <a:picLocks noChangeAspect="1"/>
+          </p:cNvPicPr>
+          <p:nvPr/>
+        </p:nvPicPr>
+        <p:blipFill>
+          <a:blip r:embed="rId3"/>
+          <a:stretch>
+            <a:fillRect/>
+          </a:stretch>
+        </p:blipFill>
+        <p:spPr>
+          <a:xfrm>
+            <a:off x="838200" y="1690688"/>
+            <a:ext cx="9744075" cy="4533900"/>
+          </a:xfrm>
+          <a:prstGeom prst="rect">
+            <a:avLst/>
+          </a:prstGeom>
+        </p:spPr>
+      </p:pic>
+    </p:spTree>
+    <p:extLst>
+      <p:ext uri="{BB962C8B-B14F-4D97-AF65-F5344CB8AC3E}">
+        <p14:creationId xmlns:p14="http://schemas.microsoft.com/office/powerpoint/2010/main" val="3421843920"/>
+      </p:ext>
+    </p:extLst>
+  </p:cSld>
+  <p:clrMapOvr>
+    <a:masterClrMapping/>
+  </p:clrMapOvr>
+  <mc:AlternateContent xmlns:mc="http://schemas.openxmlformats.org/markup-compatibility/2006" xmlns:p14="http://schemas.microsoft.com/office/powerpoint/2010/main">
+    <mc:Choice Requires="p14">
+      <p:transition spd="slow" p14:dur="2000"/>
+    </mc:Choice>
+    <mc:Fallback xmlns="">
+      <p:transition spd="slow"/>
+    </mc:Fallback>
+  </mc:AlternateContent>
+  <p:timing>
+    <p:tnLst>
+      <p:par>
+        <p:cTn id="1" dur="indefinite" restart="never" nodeType="tmRoot"/>
+      </p:par>
+    </p:tnLst>
+  </p:timing>
+</p:sld>
+</file>
+
+<file path=ppt/slides/slide88.xml><?xml version="1.0" encoding="utf-8"?>
+<p:sld xmlns:a="http://schemas.openxmlformats.org/drawingml/2006/main" xmlns:r="http://schemas.openxmlformats.org/officeDocument/2006/relationships" xmlns:p="http://schemas.openxmlformats.org/presentationml/2006/main">
+  <p:cSld>
+    <p:spTree>
+      <p:nvGrpSpPr>
+        <p:cNvPr id="1" name=""/>
+        <p:cNvGrpSpPr/>
+        <p:nvPr/>
+      </p:nvGrpSpPr>
+      <p:grpSpPr>
+        <a:xfrm>
+          <a:off x="0" y="0"/>
+          <a:ext cx="0" cy="0"/>
+          <a:chOff x="0" y="0"/>
+          <a:chExt cx="0" cy="0"/>
+        </a:xfrm>
+      </p:grpSpPr>
+      <p:sp>
+        <p:nvSpPr>
+          <p:cNvPr id="2" name="Title 1"/>
+          <p:cNvSpPr>
+            <a:spLocks noGrp="1"/>
+          </p:cNvSpPr>
+          <p:nvPr>
+            <p:ph type="title"/>
+          </p:nvPr>
+        </p:nvSpPr>
+        <p:spPr/>
+        <p:txBody>
+          <a:bodyPr>
+            <a:normAutofit/>
+          </a:bodyPr>
+          <a:lstStyle/>
+          <a:p>
+            <a:r>
+              <a:rPr lang="en-US" sz="4800" dirty="0"/>
+              <a:t>Key #4: Integration tests</a:t>
+            </a:r>
+          </a:p>
+        </p:txBody>
+      </p:sp>
+      <p:sp>
+        <p:nvSpPr>
+          <p:cNvPr id="3" name="Content Placeholder 2"/>
+          <p:cNvSpPr>
+            <a:spLocks noGrp="1"/>
+          </p:cNvSpPr>
+          <p:nvPr>
+            <p:ph idx="1"/>
+          </p:nvPr>
+        </p:nvSpPr>
         <p:spPr/>
         <p:txBody>
           <a:bodyPr>
@@ -31816,7 +32150,7 @@
 </p:sld>
 </file>
 
-<file path=ppt/slides/slide88.xml><?xml version="1.0" encoding="utf-8"?>
+<file path=ppt/slides/slide89.xml><?xml version="1.0" encoding="utf-8"?>
 <p:sld xmlns:a="http://schemas.openxmlformats.org/drawingml/2006/main" xmlns:r="http://schemas.openxmlformats.org/officeDocument/2006/relationships" xmlns:p="http://schemas.openxmlformats.org/presentationml/2006/main">
   <p:cSld>
     <p:spTree>
@@ -31902,7 +32236,83 @@
 </p:sld>
 </file>
 
-<file path=ppt/slides/slide89.xml><?xml version="1.0" encoding="utf-8"?>
+<file path=ppt/slides/slide9.xml><?xml version="1.0" encoding="utf-8"?>
+<p:sld xmlns:a="http://schemas.openxmlformats.org/drawingml/2006/main" xmlns:r="http://schemas.openxmlformats.org/officeDocument/2006/relationships" xmlns:p="http://schemas.openxmlformats.org/presentationml/2006/main">
+  <p:cSld>
+    <p:spTree>
+      <p:nvGrpSpPr>
+        <p:cNvPr id="1" name=""/>
+        <p:cNvGrpSpPr/>
+        <p:nvPr/>
+      </p:nvGrpSpPr>
+      <p:grpSpPr>
+        <a:xfrm>
+          <a:off x="0" y="0"/>
+          <a:ext cx="0" cy="0"/>
+          <a:chOff x="0" y="0"/>
+          <a:chExt cx="0" cy="0"/>
+        </a:xfrm>
+      </p:grpSpPr>
+      <p:sp>
+        <p:nvSpPr>
+          <p:cNvPr id="2" name="Title 1"/>
+          <p:cNvSpPr>
+            <a:spLocks noGrp="1"/>
+          </p:cNvSpPr>
+          <p:nvPr>
+            <p:ph type="title"/>
+          </p:nvPr>
+        </p:nvSpPr>
+        <p:spPr>
+          <a:xfrm>
+            <a:off x="905934" y="2380192"/>
+            <a:ext cx="10515600" cy="1325563"/>
+          </a:xfrm>
+        </p:spPr>
+        <p:txBody>
+          <a:bodyPr>
+            <a:normAutofit/>
+          </a:bodyPr>
+          <a:lstStyle/>
+          <a:p>
+            <a:pPr algn="ctr"/>
+            <a:r>
+              <a:rPr lang="en-US" sz="4800" dirty="0" smtClean="0"/>
+              <a:t>Why is test setup</a:t>
+            </a:r>
+            <a:r>
+              <a:rPr lang="en-US" sz="4800" dirty="0"/>
+              <a:t> </a:t>
+            </a:r>
+            <a:r>
+              <a:rPr lang="en-US" sz="4800" dirty="0" smtClean="0"/>
+              <a:t>so important?</a:t>
+            </a:r>
+            <a:endParaRPr lang="en-US" sz="4800" dirty="0"/>
+          </a:p>
+        </p:txBody>
+      </p:sp>
+    </p:spTree>
+    <p:extLst>
+      <p:ext uri="{BB962C8B-B14F-4D97-AF65-F5344CB8AC3E}">
+        <p14:creationId xmlns:p14="http://schemas.microsoft.com/office/powerpoint/2010/main" val="3988240435"/>
+      </p:ext>
+    </p:extLst>
+  </p:cSld>
+  <p:clrMapOvr>
+    <a:masterClrMapping/>
+  </p:clrMapOvr>
+  <p:timing>
+    <p:tnLst>
+      <p:par>
+        <p:cTn id="1" dur="indefinite" restart="never" nodeType="tmRoot"/>
+      </p:par>
+    </p:tnLst>
+  </p:timing>
+</p:sld>
+</file>
+
+<file path=ppt/slides/slide90.xml><?xml version="1.0" encoding="utf-8"?>
 <p:sld xmlns:a="http://schemas.openxmlformats.org/drawingml/2006/main" xmlns:r="http://schemas.openxmlformats.org/officeDocument/2006/relationships" xmlns:p="http://schemas.openxmlformats.org/presentationml/2006/main">
   <p:cSld>
     <p:spTree>
@@ -31963,83 +32373,7 @@
 </p:sld>
 </file>
 
-<file path=ppt/slides/slide9.xml><?xml version="1.0" encoding="utf-8"?>
-<p:sld xmlns:a="http://schemas.openxmlformats.org/drawingml/2006/main" xmlns:r="http://schemas.openxmlformats.org/officeDocument/2006/relationships" xmlns:p="http://schemas.openxmlformats.org/presentationml/2006/main">
-  <p:cSld>
-    <p:spTree>
-      <p:nvGrpSpPr>
-        <p:cNvPr id="1" name=""/>
-        <p:cNvGrpSpPr/>
-        <p:nvPr/>
-      </p:nvGrpSpPr>
-      <p:grpSpPr>
-        <a:xfrm>
-          <a:off x="0" y="0"/>
-          <a:ext cx="0" cy="0"/>
-          <a:chOff x="0" y="0"/>
-          <a:chExt cx="0" cy="0"/>
-        </a:xfrm>
-      </p:grpSpPr>
-      <p:sp>
-        <p:nvSpPr>
-          <p:cNvPr id="2" name="Title 1"/>
-          <p:cNvSpPr>
-            <a:spLocks noGrp="1"/>
-          </p:cNvSpPr>
-          <p:nvPr>
-            <p:ph type="title"/>
-          </p:nvPr>
-        </p:nvSpPr>
-        <p:spPr>
-          <a:xfrm>
-            <a:off x="905934" y="2380192"/>
-            <a:ext cx="10515600" cy="1325563"/>
-          </a:xfrm>
-        </p:spPr>
-        <p:txBody>
-          <a:bodyPr>
-            <a:normAutofit/>
-          </a:bodyPr>
-          <a:lstStyle/>
-          <a:p>
-            <a:pPr algn="ctr"/>
-            <a:r>
-              <a:rPr lang="en-US" sz="4800" dirty="0" smtClean="0"/>
-              <a:t>Why is test setup</a:t>
-            </a:r>
-            <a:r>
-              <a:rPr lang="en-US" sz="4800" dirty="0"/>
-              <a:t> </a:t>
-            </a:r>
-            <a:r>
-              <a:rPr lang="en-US" sz="4800" dirty="0" smtClean="0"/>
-              <a:t>so important?</a:t>
-            </a:r>
-            <a:endParaRPr lang="en-US" sz="4800" dirty="0"/>
-          </a:p>
-        </p:txBody>
-      </p:sp>
-    </p:spTree>
-    <p:extLst>
-      <p:ext uri="{BB962C8B-B14F-4D97-AF65-F5344CB8AC3E}">
-        <p14:creationId xmlns:p14="http://schemas.microsoft.com/office/powerpoint/2010/main" val="3988240435"/>
-      </p:ext>
-    </p:extLst>
-  </p:cSld>
-  <p:clrMapOvr>
-    <a:masterClrMapping/>
-  </p:clrMapOvr>
-  <p:timing>
-    <p:tnLst>
-      <p:par>
-        <p:cTn id="1" dur="indefinite" restart="never" nodeType="tmRoot"/>
-      </p:par>
-    </p:tnLst>
-  </p:timing>
-</p:sld>
-</file>
-
-<file path=ppt/slides/slide90.xml><?xml version="1.0" encoding="utf-8"?>
+<file path=ppt/slides/slide91.xml><?xml version="1.0" encoding="utf-8"?>
 <p:sld xmlns:a="http://schemas.openxmlformats.org/drawingml/2006/main" xmlns:r="http://schemas.openxmlformats.org/officeDocument/2006/relationships" xmlns:p="http://schemas.openxmlformats.org/presentationml/2006/main">
   <p:cSld>
     <p:spTree>
@@ -32100,7 +32434,7 @@
 </p:sld>
 </file>
 
-<file path=ppt/slides/slide91.xml><?xml version="1.0" encoding="utf-8"?>
+<file path=ppt/slides/slide92.xml><?xml version="1.0" encoding="utf-8"?>
 <p:sld xmlns:a="http://schemas.openxmlformats.org/drawingml/2006/main" xmlns:r="http://schemas.openxmlformats.org/officeDocument/2006/relationships" xmlns:p="http://schemas.openxmlformats.org/presentationml/2006/main">
   <p:cSld>
     <p:spTree>
@@ -32210,7 +32544,7 @@
 </p:sld>
 </file>
 
-<file path=ppt/slides/slide92.xml><?xml version="1.0" encoding="utf-8"?>
+<file path=ppt/slides/slide93.xml><?xml version="1.0" encoding="utf-8"?>
 <p:sld xmlns:a="http://schemas.openxmlformats.org/drawingml/2006/main" xmlns:r="http://schemas.openxmlformats.org/officeDocument/2006/relationships" xmlns:p="http://schemas.openxmlformats.org/presentationml/2006/main">
   <p:cSld>
     <p:spTree>
@@ -32364,7 +32698,7 @@
 </p:sld>
 </file>
 
-<file path=ppt/slides/slide93.xml><?xml version="1.0" encoding="utf-8"?>
+<file path=ppt/slides/slide94.xml><?xml version="1.0" encoding="utf-8"?>
 <p:sld xmlns:a="http://schemas.openxmlformats.org/drawingml/2006/main" xmlns:r="http://schemas.openxmlformats.org/officeDocument/2006/relationships" xmlns:p="http://schemas.openxmlformats.org/presentationml/2006/main">
   <p:cSld>
     <p:spTree>

</xml_diff>